<commit_message>
fix: stakeholder matrix and quality slides fix
Signed-off-by: the-other-mariana <mariana.avalos.arce@gmail.com>
</commit_message>
<xml_diff>
--- a/PM1/project-planning/week6/ideas.pptx
+++ b/PM1/project-planning/week6/ideas.pptx
@@ -12,6 +12,9 @@
     <p:sldId id="260" r:id="rId6"/>
     <p:sldId id="263" r:id="rId7"/>
     <p:sldId id="261" r:id="rId8"/>
+    <p:sldId id="264" r:id="rId9"/>
+    <p:sldId id="265" r:id="rId10"/>
+    <p:sldId id="266" r:id="rId11"/>
   </p:sldIdLst>
   <p:sldSz cx="12192000" cy="6858000"/>
   <p:notesSz cx="6858000" cy="9144000"/>
@@ -267,7 +270,7 @@
           <a:p>
             <a:fld id="{64AF7922-E34A-4A1F-BA1D-585994EB53A8}" type="datetimeFigureOut">
               <a:rPr lang="es-419" smtClean="0"/>
-              <a:t>12/10/2022</a:t>
+              <a:t>17/10/2022</a:t>
             </a:fld>
             <a:endParaRPr lang="es-419"/>
           </a:p>
@@ -467,7 +470,7 @@
           <a:p>
             <a:fld id="{64AF7922-E34A-4A1F-BA1D-585994EB53A8}" type="datetimeFigureOut">
               <a:rPr lang="es-419" smtClean="0"/>
-              <a:t>12/10/2022</a:t>
+              <a:t>17/10/2022</a:t>
             </a:fld>
             <a:endParaRPr lang="es-419"/>
           </a:p>
@@ -677,7 +680,7 @@
           <a:p>
             <a:fld id="{64AF7922-E34A-4A1F-BA1D-585994EB53A8}" type="datetimeFigureOut">
               <a:rPr lang="es-419" smtClean="0"/>
-              <a:t>12/10/2022</a:t>
+              <a:t>17/10/2022</a:t>
             </a:fld>
             <a:endParaRPr lang="es-419"/>
           </a:p>
@@ -877,7 +880,7 @@
           <a:p>
             <a:fld id="{64AF7922-E34A-4A1F-BA1D-585994EB53A8}" type="datetimeFigureOut">
               <a:rPr lang="es-419" smtClean="0"/>
-              <a:t>12/10/2022</a:t>
+              <a:t>17/10/2022</a:t>
             </a:fld>
             <a:endParaRPr lang="es-419"/>
           </a:p>
@@ -1153,7 +1156,7 @@
           <a:p>
             <a:fld id="{64AF7922-E34A-4A1F-BA1D-585994EB53A8}" type="datetimeFigureOut">
               <a:rPr lang="es-419" smtClean="0"/>
-              <a:t>12/10/2022</a:t>
+              <a:t>17/10/2022</a:t>
             </a:fld>
             <a:endParaRPr lang="es-419"/>
           </a:p>
@@ -1421,7 +1424,7 @@
           <a:p>
             <a:fld id="{64AF7922-E34A-4A1F-BA1D-585994EB53A8}" type="datetimeFigureOut">
               <a:rPr lang="es-419" smtClean="0"/>
-              <a:t>12/10/2022</a:t>
+              <a:t>17/10/2022</a:t>
             </a:fld>
             <a:endParaRPr lang="es-419"/>
           </a:p>
@@ -1836,7 +1839,7 @@
           <a:p>
             <a:fld id="{64AF7922-E34A-4A1F-BA1D-585994EB53A8}" type="datetimeFigureOut">
               <a:rPr lang="es-419" smtClean="0"/>
-              <a:t>12/10/2022</a:t>
+              <a:t>17/10/2022</a:t>
             </a:fld>
             <a:endParaRPr lang="es-419"/>
           </a:p>
@@ -1978,7 +1981,7 @@
           <a:p>
             <a:fld id="{64AF7922-E34A-4A1F-BA1D-585994EB53A8}" type="datetimeFigureOut">
               <a:rPr lang="es-419" smtClean="0"/>
-              <a:t>12/10/2022</a:t>
+              <a:t>17/10/2022</a:t>
             </a:fld>
             <a:endParaRPr lang="es-419"/>
           </a:p>
@@ -2091,7 +2094,7 @@
           <a:p>
             <a:fld id="{64AF7922-E34A-4A1F-BA1D-585994EB53A8}" type="datetimeFigureOut">
               <a:rPr lang="es-419" smtClean="0"/>
-              <a:t>12/10/2022</a:t>
+              <a:t>17/10/2022</a:t>
             </a:fld>
             <a:endParaRPr lang="es-419"/>
           </a:p>
@@ -2404,7 +2407,7 @@
           <a:p>
             <a:fld id="{64AF7922-E34A-4A1F-BA1D-585994EB53A8}" type="datetimeFigureOut">
               <a:rPr lang="es-419" smtClean="0"/>
-              <a:t>12/10/2022</a:t>
+              <a:t>17/10/2022</a:t>
             </a:fld>
             <a:endParaRPr lang="es-419"/>
           </a:p>
@@ -2693,7 +2696,7 @@
           <a:p>
             <a:fld id="{64AF7922-E34A-4A1F-BA1D-585994EB53A8}" type="datetimeFigureOut">
               <a:rPr lang="es-419" smtClean="0"/>
-              <a:t>12/10/2022</a:t>
+              <a:t>17/10/2022</a:t>
             </a:fld>
             <a:endParaRPr lang="es-419"/>
           </a:p>
@@ -2936,7 +2939,7 @@
           <a:p>
             <a:fld id="{64AF7922-E34A-4A1F-BA1D-585994EB53A8}" type="datetimeFigureOut">
               <a:rPr lang="es-419" smtClean="0"/>
-              <a:t>12/10/2022</a:t>
+              <a:t>17/10/2022</a:t>
             </a:fld>
             <a:endParaRPr lang="es-419"/>
           </a:p>
@@ -3624,9 +3627,9 @@
           <p:nvPr/>
         </p:nvSpPr>
         <p:spPr>
-          <a:xfrm>
-            <a:off x="2149641" y="1213392"/>
-            <a:ext cx="1876925" cy="369332"/>
+          <a:xfrm rot="5400000">
+            <a:off x="1610364" y="3779308"/>
+            <a:ext cx="1876925" cy="400110"/>
           </a:xfrm>
           <a:prstGeom prst="rect">
             <a:avLst/>
@@ -3640,7 +3643,7 @@
           <a:lstStyle/>
           <a:p>
             <a:r>
-              <a:rPr lang="es-419" dirty="0"/>
+              <a:rPr lang="es-419" sz="2000" dirty="0"/>
               <a:t>Poder</a:t>
             </a:r>
           </a:p>
@@ -3660,8 +3663,8 @@
         </p:nvSpPr>
         <p:spPr>
           <a:xfrm>
-            <a:off x="2773679" y="6074151"/>
-            <a:ext cx="1876925" cy="369332"/>
+            <a:off x="5701131" y="6151778"/>
+            <a:ext cx="1876925" cy="400110"/>
           </a:xfrm>
           <a:prstGeom prst="rect">
             <a:avLst/>
@@ -3675,7 +3678,7 @@
           <a:lstStyle/>
           <a:p>
             <a:r>
-              <a:rPr lang="es-419" dirty="0"/>
+              <a:rPr lang="es-419" sz="2000" dirty="0"/>
               <a:t>Interés</a:t>
             </a:r>
           </a:p>
@@ -4382,10 +4385,1658 @@
           </a:p>
         </p:txBody>
       </p:sp>
+      <p:sp>
+        <p:nvSpPr>
+          <p:cNvPr id="2" name="TextBox 1">
+            <a:extLst>
+              <a:ext uri="{FF2B5EF4-FFF2-40B4-BE49-F238E27FC236}">
+                <a16:creationId xmlns:a16="http://schemas.microsoft.com/office/drawing/2014/main" id="{3BC1476B-1EFA-2AF7-5E35-12BF7A352DBA}"/>
+              </a:ext>
+            </a:extLst>
+          </p:cNvPr>
+          <p:cNvSpPr txBox="1"/>
+          <p:nvPr/>
+        </p:nvSpPr>
+        <p:spPr>
+          <a:xfrm>
+            <a:off x="3870168" y="5793429"/>
+            <a:ext cx="710222" cy="338554"/>
+          </a:xfrm>
+          <a:prstGeom prst="rect">
+            <a:avLst/>
+          </a:prstGeom>
+          <a:noFill/>
+        </p:spPr>
+        <p:txBody>
+          <a:bodyPr wrap="square" rtlCol="0">
+            <a:spAutoFit/>
+          </a:bodyPr>
+          <a:lstStyle/>
+          <a:p>
+            <a:r>
+              <a:rPr lang="es-419" sz="1600" dirty="0"/>
+              <a:t>bajo</a:t>
+            </a:r>
+          </a:p>
+        </p:txBody>
+      </p:sp>
+      <p:sp>
+        <p:nvSpPr>
+          <p:cNvPr id="4" name="TextBox 3">
+            <a:extLst>
+              <a:ext uri="{FF2B5EF4-FFF2-40B4-BE49-F238E27FC236}">
+                <a16:creationId xmlns:a16="http://schemas.microsoft.com/office/drawing/2014/main" id="{1B8D740F-BEEC-07F3-2B00-3B71522A71C2}"/>
+              </a:ext>
+            </a:extLst>
+          </p:cNvPr>
+          <p:cNvSpPr txBox="1"/>
+          <p:nvPr/>
+        </p:nvSpPr>
+        <p:spPr>
+          <a:xfrm>
+            <a:off x="5740257" y="5793429"/>
+            <a:ext cx="710222" cy="338554"/>
+          </a:xfrm>
+          <a:prstGeom prst="rect">
+            <a:avLst/>
+          </a:prstGeom>
+          <a:noFill/>
+        </p:spPr>
+        <p:txBody>
+          <a:bodyPr wrap="square" rtlCol="0">
+            <a:spAutoFit/>
+          </a:bodyPr>
+          <a:lstStyle/>
+          <a:p>
+            <a:r>
+              <a:rPr lang="es-419" sz="1600" dirty="0"/>
+              <a:t>medio</a:t>
+            </a:r>
+          </a:p>
+        </p:txBody>
+      </p:sp>
+      <p:sp>
+        <p:nvSpPr>
+          <p:cNvPr id="6" name="TextBox 5">
+            <a:extLst>
+              <a:ext uri="{FF2B5EF4-FFF2-40B4-BE49-F238E27FC236}">
+                <a16:creationId xmlns:a16="http://schemas.microsoft.com/office/drawing/2014/main" id="{9785C5FD-3D32-AC01-EAD1-2BA3D7F72A54}"/>
+              </a:ext>
+            </a:extLst>
+          </p:cNvPr>
+          <p:cNvSpPr txBox="1"/>
+          <p:nvPr/>
+        </p:nvSpPr>
+        <p:spPr>
+          <a:xfrm>
+            <a:off x="7904300" y="5775266"/>
+            <a:ext cx="710222" cy="338554"/>
+          </a:xfrm>
+          <a:prstGeom prst="rect">
+            <a:avLst/>
+          </a:prstGeom>
+          <a:noFill/>
+        </p:spPr>
+        <p:txBody>
+          <a:bodyPr wrap="square" rtlCol="0">
+            <a:spAutoFit/>
+          </a:bodyPr>
+          <a:lstStyle/>
+          <a:p>
+            <a:r>
+              <a:rPr lang="es-419" sz="1600" dirty="0"/>
+              <a:t>alto</a:t>
+            </a:r>
+          </a:p>
+        </p:txBody>
+      </p:sp>
+      <p:sp>
+        <p:nvSpPr>
+          <p:cNvPr id="9" name="TextBox 8">
+            <a:extLst>
+              <a:ext uri="{FF2B5EF4-FFF2-40B4-BE49-F238E27FC236}">
+                <a16:creationId xmlns:a16="http://schemas.microsoft.com/office/drawing/2014/main" id="{AD7585D3-7BAE-3E8E-16C9-C54CAB4976AF}"/>
+              </a:ext>
+            </a:extLst>
+          </p:cNvPr>
+          <p:cNvSpPr txBox="1"/>
+          <p:nvPr/>
+        </p:nvSpPr>
+        <p:spPr>
+          <a:xfrm rot="5400000">
+            <a:off x="2572983" y="4875520"/>
+            <a:ext cx="710222" cy="338554"/>
+          </a:xfrm>
+          <a:prstGeom prst="rect">
+            <a:avLst/>
+          </a:prstGeom>
+          <a:noFill/>
+        </p:spPr>
+        <p:txBody>
+          <a:bodyPr wrap="square" rtlCol="0">
+            <a:spAutoFit/>
+          </a:bodyPr>
+          <a:lstStyle/>
+          <a:p>
+            <a:r>
+              <a:rPr lang="es-419" sz="1600" dirty="0"/>
+              <a:t>bajo</a:t>
+            </a:r>
+          </a:p>
+        </p:txBody>
+      </p:sp>
+      <p:sp>
+        <p:nvSpPr>
+          <p:cNvPr id="25" name="TextBox 24">
+            <a:extLst>
+              <a:ext uri="{FF2B5EF4-FFF2-40B4-BE49-F238E27FC236}">
+                <a16:creationId xmlns:a16="http://schemas.microsoft.com/office/drawing/2014/main" id="{CA83713F-39F0-5B25-24FD-89D7B4750E26}"/>
+              </a:ext>
+            </a:extLst>
+          </p:cNvPr>
+          <p:cNvSpPr txBox="1"/>
+          <p:nvPr/>
+        </p:nvSpPr>
+        <p:spPr>
+          <a:xfrm rot="5400000">
+            <a:off x="2600835" y="3234052"/>
+            <a:ext cx="710222" cy="338554"/>
+          </a:xfrm>
+          <a:prstGeom prst="rect">
+            <a:avLst/>
+          </a:prstGeom>
+          <a:noFill/>
+        </p:spPr>
+        <p:txBody>
+          <a:bodyPr wrap="square" rtlCol="0">
+            <a:spAutoFit/>
+          </a:bodyPr>
+          <a:lstStyle/>
+          <a:p>
+            <a:r>
+              <a:rPr lang="es-419" sz="1600" dirty="0"/>
+              <a:t>medio</a:t>
+            </a:r>
+          </a:p>
+        </p:txBody>
+      </p:sp>
+      <p:sp>
+        <p:nvSpPr>
+          <p:cNvPr id="30" name="TextBox 29">
+            <a:extLst>
+              <a:ext uri="{FF2B5EF4-FFF2-40B4-BE49-F238E27FC236}">
+                <a16:creationId xmlns:a16="http://schemas.microsoft.com/office/drawing/2014/main" id="{2564213E-7914-BDE5-9CCD-2F40FE682937}"/>
+              </a:ext>
+            </a:extLst>
+          </p:cNvPr>
+          <p:cNvSpPr txBox="1"/>
+          <p:nvPr/>
+        </p:nvSpPr>
+        <p:spPr>
+          <a:xfrm rot="5400000">
+            <a:off x="2605566" y="1798574"/>
+            <a:ext cx="710222" cy="338554"/>
+          </a:xfrm>
+          <a:prstGeom prst="rect">
+            <a:avLst/>
+          </a:prstGeom>
+          <a:noFill/>
+        </p:spPr>
+        <p:txBody>
+          <a:bodyPr wrap="square" rtlCol="0">
+            <a:spAutoFit/>
+          </a:bodyPr>
+          <a:lstStyle/>
+          <a:p>
+            <a:r>
+              <a:rPr lang="es-419" sz="1600" dirty="0"/>
+              <a:t>alto</a:t>
+            </a:r>
+          </a:p>
+        </p:txBody>
+      </p:sp>
     </p:spTree>
     <p:extLst>
       <p:ext uri="{BB962C8B-B14F-4D97-AF65-F5344CB8AC3E}">
         <p14:creationId xmlns:p14="http://schemas.microsoft.com/office/powerpoint/2010/main" val="2944874805"/>
+      </p:ext>
+    </p:extLst>
+  </p:cSld>
+  <p:clrMapOvr>
+    <a:masterClrMapping/>
+  </p:clrMapOvr>
+</p:sld>
+</file>
+
+<file path=ppt/slides/slide10.xml><?xml version="1.0" encoding="utf-8"?>
+<p:sld xmlns:a="http://schemas.openxmlformats.org/drawingml/2006/main" xmlns:r="http://schemas.openxmlformats.org/officeDocument/2006/relationships" xmlns:p="http://schemas.openxmlformats.org/presentationml/2006/main">
+  <p:cSld>
+    <p:spTree>
+      <p:nvGrpSpPr>
+        <p:cNvPr id="1" name=""/>
+        <p:cNvGrpSpPr/>
+        <p:nvPr/>
+      </p:nvGrpSpPr>
+      <p:grpSpPr>
+        <a:xfrm>
+          <a:off x="0" y="0"/>
+          <a:ext cx="0" cy="0"/>
+          <a:chOff x="0" y="0"/>
+          <a:chExt cx="0" cy="0"/>
+        </a:xfrm>
+      </p:grpSpPr>
+      <p:sp>
+        <p:nvSpPr>
+          <p:cNvPr id="34" name="Rectangle 33">
+            <a:extLst>
+              <a:ext uri="{FF2B5EF4-FFF2-40B4-BE49-F238E27FC236}">
+                <a16:creationId xmlns:a16="http://schemas.microsoft.com/office/drawing/2014/main" id="{F778B956-CCD9-B935-7BCF-00AD0B189D4A}"/>
+              </a:ext>
+            </a:extLst>
+          </p:cNvPr>
+          <p:cNvSpPr/>
+          <p:nvPr/>
+        </p:nvSpPr>
+        <p:spPr>
+          <a:xfrm>
+            <a:off x="745951" y="242251"/>
+            <a:ext cx="10545632" cy="6536053"/>
+          </a:xfrm>
+          <a:prstGeom prst="rect">
+            <a:avLst/>
+          </a:prstGeom>
+        </p:spPr>
+        <p:style>
+          <a:lnRef idx="2">
+            <a:schemeClr val="accent3">
+              <a:shade val="50000"/>
+            </a:schemeClr>
+          </a:lnRef>
+          <a:fillRef idx="1">
+            <a:schemeClr val="accent3"/>
+          </a:fillRef>
+          <a:effectRef idx="0">
+            <a:schemeClr val="accent3"/>
+          </a:effectRef>
+          <a:fontRef idx="minor">
+            <a:schemeClr val="lt1"/>
+          </a:fontRef>
+        </p:style>
+        <p:txBody>
+          <a:bodyPr rtlCol="0" anchor="ctr"/>
+          <a:lstStyle/>
+          <a:p>
+            <a:pPr algn="ctr"/>
+            <a:endParaRPr lang="es-419"/>
+          </a:p>
+        </p:txBody>
+      </p:sp>
+      <p:grpSp>
+        <p:nvGrpSpPr>
+          <p:cNvPr id="35" name="Group 34">
+            <a:extLst>
+              <a:ext uri="{FF2B5EF4-FFF2-40B4-BE49-F238E27FC236}">
+                <a16:creationId xmlns:a16="http://schemas.microsoft.com/office/drawing/2014/main" id="{BACDAEFF-C3C4-3B29-0575-E9663EA6ED7E}"/>
+              </a:ext>
+            </a:extLst>
+          </p:cNvPr>
+          <p:cNvGrpSpPr/>
+          <p:nvPr/>
+        </p:nvGrpSpPr>
+        <p:grpSpPr>
+          <a:xfrm>
+            <a:off x="2348772" y="1144775"/>
+            <a:ext cx="7019015" cy="5407113"/>
+            <a:chOff x="2348772" y="1144775"/>
+            <a:chExt cx="7019015" cy="5407113"/>
+          </a:xfrm>
+        </p:grpSpPr>
+        <p:cxnSp>
+          <p:nvCxnSpPr>
+            <p:cNvPr id="2" name="Straight Arrow Connector 1">
+              <a:extLst>
+                <a:ext uri="{FF2B5EF4-FFF2-40B4-BE49-F238E27FC236}">
+                  <a16:creationId xmlns:a16="http://schemas.microsoft.com/office/drawing/2014/main" id="{C700AB91-F404-49FF-6039-BDA0F068019C}"/>
+                </a:ext>
+              </a:extLst>
+            </p:cNvPr>
+            <p:cNvCxnSpPr/>
+            <p:nvPr/>
+          </p:nvCxnSpPr>
+          <p:spPr>
+            <a:xfrm flipV="1">
+              <a:off x="3205212" y="1144775"/>
+              <a:ext cx="0" cy="4841508"/>
+            </a:xfrm>
+            <a:prstGeom prst="straightConnector1">
+              <a:avLst/>
+            </a:prstGeom>
+            <a:ln w="19050">
+              <a:solidFill>
+                <a:schemeClr val="bg1"/>
+              </a:solidFill>
+              <a:tailEnd type="triangle"/>
+            </a:ln>
+          </p:spPr>
+          <p:style>
+            <a:lnRef idx="3">
+              <a:schemeClr val="dk1"/>
+            </a:lnRef>
+            <a:fillRef idx="0">
+              <a:schemeClr val="dk1"/>
+            </a:fillRef>
+            <a:effectRef idx="2">
+              <a:schemeClr val="dk1"/>
+            </a:effectRef>
+            <a:fontRef idx="minor">
+              <a:schemeClr val="tx1"/>
+            </a:fontRef>
+          </p:style>
+        </p:cxnSp>
+        <p:cxnSp>
+          <p:nvCxnSpPr>
+            <p:cNvPr id="3" name="Straight Arrow Connector 2">
+              <a:extLst>
+                <a:ext uri="{FF2B5EF4-FFF2-40B4-BE49-F238E27FC236}">
+                  <a16:creationId xmlns:a16="http://schemas.microsoft.com/office/drawing/2014/main" id="{6D118BAA-276F-DEBC-2CE9-93CC2947714B}"/>
+                </a:ext>
+              </a:extLst>
+            </p:cNvPr>
+            <p:cNvCxnSpPr/>
+            <p:nvPr/>
+          </p:nvCxnSpPr>
+          <p:spPr>
+            <a:xfrm>
+              <a:off x="2868328" y="5736026"/>
+              <a:ext cx="6420051" cy="0"/>
+            </a:xfrm>
+            <a:prstGeom prst="straightConnector1">
+              <a:avLst/>
+            </a:prstGeom>
+            <a:ln w="19050">
+              <a:solidFill>
+                <a:schemeClr val="bg1"/>
+              </a:solidFill>
+              <a:tailEnd type="triangle"/>
+            </a:ln>
+          </p:spPr>
+          <p:style>
+            <a:lnRef idx="3">
+              <a:schemeClr val="dk1"/>
+            </a:lnRef>
+            <a:fillRef idx="0">
+              <a:schemeClr val="dk1"/>
+            </a:fillRef>
+            <a:effectRef idx="2">
+              <a:schemeClr val="dk1"/>
+            </a:effectRef>
+            <a:fontRef idx="minor">
+              <a:schemeClr val="tx1"/>
+            </a:fontRef>
+          </p:style>
+        </p:cxnSp>
+        <p:cxnSp>
+          <p:nvCxnSpPr>
+            <p:cNvPr id="4" name="Straight Connector 3">
+              <a:extLst>
+                <a:ext uri="{FF2B5EF4-FFF2-40B4-BE49-F238E27FC236}">
+                  <a16:creationId xmlns:a16="http://schemas.microsoft.com/office/drawing/2014/main" id="{85B112E9-D4CC-23B1-7D1C-3D08CEB8C256}"/>
+                </a:ext>
+              </a:extLst>
+            </p:cNvPr>
+            <p:cNvCxnSpPr/>
+            <p:nvPr/>
+          </p:nvCxnSpPr>
+          <p:spPr>
+            <a:xfrm>
+              <a:off x="5120639" y="1144775"/>
+              <a:ext cx="0" cy="4841508"/>
+            </a:xfrm>
+            <a:prstGeom prst="line">
+              <a:avLst/>
+            </a:prstGeom>
+            <a:ln w="19050" cap="flat" cmpd="sng" algn="ctr">
+              <a:solidFill>
+                <a:schemeClr val="bg1"/>
+              </a:solidFill>
+              <a:prstDash val="dash"/>
+              <a:round/>
+              <a:headEnd type="none" w="med" len="med"/>
+              <a:tailEnd type="none" w="med" len="med"/>
+            </a:ln>
+          </p:spPr>
+          <p:style>
+            <a:lnRef idx="0">
+              <a:scrgbClr r="0" g="0" b="0"/>
+            </a:lnRef>
+            <a:fillRef idx="0">
+              <a:scrgbClr r="0" g="0" b="0"/>
+            </a:fillRef>
+            <a:effectRef idx="0">
+              <a:scrgbClr r="0" g="0" b="0"/>
+            </a:effectRef>
+            <a:fontRef idx="minor">
+              <a:schemeClr val="tx1"/>
+            </a:fontRef>
+          </p:style>
+        </p:cxnSp>
+        <p:cxnSp>
+          <p:nvCxnSpPr>
+            <p:cNvPr id="5" name="Straight Connector 4">
+              <a:extLst>
+                <a:ext uri="{FF2B5EF4-FFF2-40B4-BE49-F238E27FC236}">
+                  <a16:creationId xmlns:a16="http://schemas.microsoft.com/office/drawing/2014/main" id="{5005F5C2-5202-44BF-1FD0-391D1A01B098}"/>
+                </a:ext>
+              </a:extLst>
+            </p:cNvPr>
+            <p:cNvCxnSpPr/>
+            <p:nvPr/>
+          </p:nvCxnSpPr>
+          <p:spPr>
+            <a:xfrm>
+              <a:off x="7140340" y="1144775"/>
+              <a:ext cx="0" cy="4841508"/>
+            </a:xfrm>
+            <a:prstGeom prst="line">
+              <a:avLst/>
+            </a:prstGeom>
+            <a:ln w="19050" cap="flat" cmpd="sng" algn="ctr">
+              <a:solidFill>
+                <a:schemeClr val="bg1"/>
+              </a:solidFill>
+              <a:prstDash val="dash"/>
+              <a:round/>
+              <a:headEnd type="none" w="med" len="med"/>
+              <a:tailEnd type="none" w="med" len="med"/>
+            </a:ln>
+          </p:spPr>
+          <p:style>
+            <a:lnRef idx="0">
+              <a:scrgbClr r="0" g="0" b="0"/>
+            </a:lnRef>
+            <a:fillRef idx="0">
+              <a:scrgbClr r="0" g="0" b="0"/>
+            </a:fillRef>
+            <a:effectRef idx="0">
+              <a:scrgbClr r="0" g="0" b="0"/>
+            </a:effectRef>
+            <a:fontRef idx="minor">
+              <a:schemeClr val="tx1"/>
+            </a:fontRef>
+          </p:style>
+        </p:cxnSp>
+        <p:cxnSp>
+          <p:nvCxnSpPr>
+            <p:cNvPr id="6" name="Straight Connector 5">
+              <a:extLst>
+                <a:ext uri="{FF2B5EF4-FFF2-40B4-BE49-F238E27FC236}">
+                  <a16:creationId xmlns:a16="http://schemas.microsoft.com/office/drawing/2014/main" id="{D9CCDD54-2014-2BEA-1F1B-E4312374D887}"/>
+                </a:ext>
+              </a:extLst>
+            </p:cNvPr>
+            <p:cNvCxnSpPr/>
+            <p:nvPr/>
+          </p:nvCxnSpPr>
+          <p:spPr>
+            <a:xfrm>
+              <a:off x="2974206" y="2588565"/>
+              <a:ext cx="6198670" cy="0"/>
+            </a:xfrm>
+            <a:prstGeom prst="line">
+              <a:avLst/>
+            </a:prstGeom>
+            <a:ln w="19050" cap="flat" cmpd="sng" algn="ctr">
+              <a:solidFill>
+                <a:schemeClr val="bg1"/>
+              </a:solidFill>
+              <a:prstDash val="dash"/>
+              <a:round/>
+              <a:headEnd type="none" w="med" len="med"/>
+              <a:tailEnd type="none" w="med" len="med"/>
+            </a:ln>
+          </p:spPr>
+          <p:style>
+            <a:lnRef idx="0">
+              <a:scrgbClr r="0" g="0" b="0"/>
+            </a:lnRef>
+            <a:fillRef idx="0">
+              <a:scrgbClr r="0" g="0" b="0"/>
+            </a:fillRef>
+            <a:effectRef idx="0">
+              <a:scrgbClr r="0" g="0" b="0"/>
+            </a:effectRef>
+            <a:fontRef idx="minor">
+              <a:schemeClr val="tx1"/>
+            </a:fontRef>
+          </p:style>
+        </p:cxnSp>
+        <p:cxnSp>
+          <p:nvCxnSpPr>
+            <p:cNvPr id="7" name="Straight Connector 6">
+              <a:extLst>
+                <a:ext uri="{FF2B5EF4-FFF2-40B4-BE49-F238E27FC236}">
+                  <a16:creationId xmlns:a16="http://schemas.microsoft.com/office/drawing/2014/main" id="{E3BA9CCF-7CC5-091C-8CC1-3D22AE795066}"/>
+                </a:ext>
+              </a:extLst>
+            </p:cNvPr>
+            <p:cNvCxnSpPr/>
+            <p:nvPr/>
+          </p:nvCxnSpPr>
+          <p:spPr>
+            <a:xfrm>
+              <a:off x="2974206" y="4175128"/>
+              <a:ext cx="6198670" cy="0"/>
+            </a:xfrm>
+            <a:prstGeom prst="line">
+              <a:avLst/>
+            </a:prstGeom>
+            <a:ln w="19050" cap="flat" cmpd="sng" algn="ctr">
+              <a:solidFill>
+                <a:schemeClr val="bg1"/>
+              </a:solidFill>
+              <a:prstDash val="dash"/>
+              <a:round/>
+              <a:headEnd type="none" w="med" len="med"/>
+              <a:tailEnd type="none" w="med" len="med"/>
+            </a:ln>
+          </p:spPr>
+          <p:style>
+            <a:lnRef idx="0">
+              <a:scrgbClr r="0" g="0" b="0"/>
+            </a:lnRef>
+            <a:fillRef idx="0">
+              <a:scrgbClr r="0" g="0" b="0"/>
+            </a:fillRef>
+            <a:effectRef idx="0">
+              <a:scrgbClr r="0" g="0" b="0"/>
+            </a:effectRef>
+            <a:fontRef idx="minor">
+              <a:schemeClr val="tx1"/>
+            </a:fontRef>
+          </p:style>
+        </p:cxnSp>
+        <p:sp>
+          <p:nvSpPr>
+            <p:cNvPr id="8" name="TextBox 7">
+              <a:extLst>
+                <a:ext uri="{FF2B5EF4-FFF2-40B4-BE49-F238E27FC236}">
+                  <a16:creationId xmlns:a16="http://schemas.microsoft.com/office/drawing/2014/main" id="{A62FCB63-940F-11FE-2981-1CDC031BAD0D}"/>
+                </a:ext>
+              </a:extLst>
+            </p:cNvPr>
+            <p:cNvSpPr txBox="1"/>
+            <p:nvPr/>
+          </p:nvSpPr>
+          <p:spPr>
+            <a:xfrm rot="5400000">
+              <a:off x="1610364" y="3779308"/>
+              <a:ext cx="1876925" cy="400110"/>
+            </a:xfrm>
+            <a:prstGeom prst="rect">
+              <a:avLst/>
+            </a:prstGeom>
+            <a:noFill/>
+          </p:spPr>
+          <p:txBody>
+            <a:bodyPr wrap="square" rtlCol="0">
+              <a:spAutoFit/>
+            </a:bodyPr>
+            <a:lstStyle/>
+            <a:p>
+              <a:r>
+                <a:rPr lang="es-419" sz="2000" dirty="0">
+                  <a:solidFill>
+                    <a:schemeClr val="bg1"/>
+                  </a:solidFill>
+                </a:rPr>
+                <a:t>Poder</a:t>
+              </a:r>
+            </a:p>
+          </p:txBody>
+        </p:sp>
+        <p:sp>
+          <p:nvSpPr>
+            <p:cNvPr id="9" name="TextBox 8">
+              <a:extLst>
+                <a:ext uri="{FF2B5EF4-FFF2-40B4-BE49-F238E27FC236}">
+                  <a16:creationId xmlns:a16="http://schemas.microsoft.com/office/drawing/2014/main" id="{C8E924D7-1490-C16B-651A-282B4631DB74}"/>
+                </a:ext>
+              </a:extLst>
+            </p:cNvPr>
+            <p:cNvSpPr txBox="1"/>
+            <p:nvPr/>
+          </p:nvSpPr>
+          <p:spPr>
+            <a:xfrm>
+              <a:off x="5701131" y="6151778"/>
+              <a:ext cx="1876925" cy="400110"/>
+            </a:xfrm>
+            <a:prstGeom prst="rect">
+              <a:avLst/>
+            </a:prstGeom>
+            <a:noFill/>
+          </p:spPr>
+          <p:txBody>
+            <a:bodyPr wrap="square" rtlCol="0">
+              <a:spAutoFit/>
+            </a:bodyPr>
+            <a:lstStyle/>
+            <a:p>
+              <a:r>
+                <a:rPr lang="es-419" sz="2000" dirty="0">
+                  <a:solidFill>
+                    <a:schemeClr val="bg1"/>
+                  </a:solidFill>
+                </a:rPr>
+                <a:t>Interés</a:t>
+              </a:r>
+            </a:p>
+          </p:txBody>
+        </p:sp>
+        <p:sp>
+          <p:nvSpPr>
+            <p:cNvPr id="10" name="TextBox 9">
+              <a:extLst>
+                <a:ext uri="{FF2B5EF4-FFF2-40B4-BE49-F238E27FC236}">
+                  <a16:creationId xmlns:a16="http://schemas.microsoft.com/office/drawing/2014/main" id="{F080242F-E126-5DEE-F6D1-C49B7AB39317}"/>
+                </a:ext>
+              </a:extLst>
+            </p:cNvPr>
+            <p:cNvSpPr txBox="1"/>
+            <p:nvPr/>
+          </p:nvSpPr>
+          <p:spPr>
+            <a:xfrm>
+              <a:off x="7411454" y="1691267"/>
+              <a:ext cx="1876925" cy="369332"/>
+            </a:xfrm>
+            <a:prstGeom prst="rect">
+              <a:avLst/>
+            </a:prstGeom>
+            <a:noFill/>
+          </p:spPr>
+          <p:txBody>
+            <a:bodyPr wrap="square" rtlCol="0">
+              <a:spAutoFit/>
+            </a:bodyPr>
+            <a:lstStyle/>
+            <a:p>
+              <a:r>
+                <a:rPr lang="es-419" dirty="0">
+                  <a:solidFill>
+                    <a:schemeClr val="bg1"/>
+                  </a:solidFill>
+                </a:rPr>
+                <a:t>Socio fundador</a:t>
+              </a:r>
+            </a:p>
+          </p:txBody>
+        </p:sp>
+        <p:sp>
+          <p:nvSpPr>
+            <p:cNvPr id="11" name="TextBox 10">
+              <a:extLst>
+                <a:ext uri="{FF2B5EF4-FFF2-40B4-BE49-F238E27FC236}">
+                  <a16:creationId xmlns:a16="http://schemas.microsoft.com/office/drawing/2014/main" id="{F1B06295-5646-0847-230D-32AA3F30DA75}"/>
+                </a:ext>
+              </a:extLst>
+            </p:cNvPr>
+            <p:cNvSpPr txBox="1"/>
+            <p:nvPr/>
+          </p:nvSpPr>
+          <p:spPr>
+            <a:xfrm>
+              <a:off x="7490862" y="3216525"/>
+              <a:ext cx="1876925" cy="369332"/>
+            </a:xfrm>
+            <a:prstGeom prst="rect">
+              <a:avLst/>
+            </a:prstGeom>
+            <a:noFill/>
+          </p:spPr>
+          <p:txBody>
+            <a:bodyPr wrap="square" rtlCol="0">
+              <a:spAutoFit/>
+            </a:bodyPr>
+            <a:lstStyle/>
+            <a:p>
+              <a:r>
+                <a:rPr lang="es-419" dirty="0">
+                  <a:solidFill>
+                    <a:schemeClr val="bg1"/>
+                  </a:solidFill>
+                </a:rPr>
+                <a:t>Usuarios PRO</a:t>
+              </a:r>
+            </a:p>
+          </p:txBody>
+        </p:sp>
+        <p:sp>
+          <p:nvSpPr>
+            <p:cNvPr id="12" name="TextBox 11">
+              <a:extLst>
+                <a:ext uri="{FF2B5EF4-FFF2-40B4-BE49-F238E27FC236}">
+                  <a16:creationId xmlns:a16="http://schemas.microsoft.com/office/drawing/2014/main" id="{DE2F6793-C063-A0B7-4499-2346DBDF6BA4}"/>
+                </a:ext>
+              </a:extLst>
+            </p:cNvPr>
+            <p:cNvSpPr txBox="1"/>
+            <p:nvPr/>
+          </p:nvSpPr>
+          <p:spPr>
+            <a:xfrm>
+              <a:off x="5391752" y="2629020"/>
+              <a:ext cx="1876925" cy="369332"/>
+            </a:xfrm>
+            <a:prstGeom prst="rect">
+              <a:avLst/>
+            </a:prstGeom>
+            <a:noFill/>
+          </p:spPr>
+          <p:txBody>
+            <a:bodyPr wrap="square" rtlCol="0">
+              <a:spAutoFit/>
+            </a:bodyPr>
+            <a:lstStyle/>
+            <a:p>
+              <a:r>
+                <a:rPr lang="es-419" dirty="0">
+                  <a:solidFill>
+                    <a:schemeClr val="bg1"/>
+                  </a:solidFill>
+                </a:rPr>
+                <a:t>Usuarios FREE</a:t>
+              </a:r>
+            </a:p>
+          </p:txBody>
+        </p:sp>
+        <p:sp>
+          <p:nvSpPr>
+            <p:cNvPr id="13" name="TextBox 12">
+              <a:extLst>
+                <a:ext uri="{FF2B5EF4-FFF2-40B4-BE49-F238E27FC236}">
+                  <a16:creationId xmlns:a16="http://schemas.microsoft.com/office/drawing/2014/main" id="{FF6B8C42-EE3F-36D1-1588-0B11554B20DF}"/>
+                </a:ext>
+              </a:extLst>
+            </p:cNvPr>
+            <p:cNvSpPr txBox="1"/>
+            <p:nvPr/>
+          </p:nvSpPr>
+          <p:spPr>
+            <a:xfrm>
+              <a:off x="5419025" y="4572082"/>
+              <a:ext cx="1876925" cy="646331"/>
+            </a:xfrm>
+            <a:prstGeom prst="rect">
+              <a:avLst/>
+            </a:prstGeom>
+            <a:noFill/>
+          </p:spPr>
+          <p:txBody>
+            <a:bodyPr wrap="square" rtlCol="0">
+              <a:spAutoFit/>
+            </a:bodyPr>
+            <a:lstStyle/>
+            <a:p>
+              <a:r>
+                <a:rPr lang="es-419" dirty="0">
+                  <a:solidFill>
+                    <a:schemeClr val="bg1"/>
+                  </a:solidFill>
+                </a:rPr>
+                <a:t>Comunidad de doctores</a:t>
+              </a:r>
+            </a:p>
+          </p:txBody>
+        </p:sp>
+        <p:sp>
+          <p:nvSpPr>
+            <p:cNvPr id="14" name="TextBox 13">
+              <a:extLst>
+                <a:ext uri="{FF2B5EF4-FFF2-40B4-BE49-F238E27FC236}">
+                  <a16:creationId xmlns:a16="http://schemas.microsoft.com/office/drawing/2014/main" id="{4D0D6A2C-251B-229F-CBEB-0136E9803790}"/>
+                </a:ext>
+              </a:extLst>
+            </p:cNvPr>
+            <p:cNvSpPr txBox="1"/>
+            <p:nvPr/>
+          </p:nvSpPr>
+          <p:spPr>
+            <a:xfrm>
+              <a:off x="5391753" y="1675045"/>
+              <a:ext cx="1876925" cy="369332"/>
+            </a:xfrm>
+            <a:prstGeom prst="rect">
+              <a:avLst/>
+            </a:prstGeom>
+            <a:noFill/>
+          </p:spPr>
+          <p:txBody>
+            <a:bodyPr wrap="square" rtlCol="0">
+              <a:spAutoFit/>
+            </a:bodyPr>
+            <a:lstStyle/>
+            <a:p>
+              <a:r>
+                <a:rPr lang="es-419" dirty="0">
+                  <a:solidFill>
+                    <a:schemeClr val="bg1"/>
+                  </a:solidFill>
+                </a:rPr>
+                <a:t>Inversionistas</a:t>
+              </a:r>
+            </a:p>
+          </p:txBody>
+        </p:sp>
+        <p:sp>
+          <p:nvSpPr>
+            <p:cNvPr id="15" name="TextBox 14">
+              <a:extLst>
+                <a:ext uri="{FF2B5EF4-FFF2-40B4-BE49-F238E27FC236}">
+                  <a16:creationId xmlns:a16="http://schemas.microsoft.com/office/drawing/2014/main" id="{5176AF37-6ECC-6E4E-F563-30787DD132F2}"/>
+                </a:ext>
+              </a:extLst>
+            </p:cNvPr>
+            <p:cNvSpPr txBox="1"/>
+            <p:nvPr/>
+          </p:nvSpPr>
+          <p:spPr>
+            <a:xfrm>
+              <a:off x="7490861" y="4456900"/>
+              <a:ext cx="1876925" cy="646331"/>
+            </a:xfrm>
+            <a:prstGeom prst="rect">
+              <a:avLst/>
+            </a:prstGeom>
+            <a:noFill/>
+          </p:spPr>
+          <p:txBody>
+            <a:bodyPr wrap="square" rtlCol="0">
+              <a:spAutoFit/>
+            </a:bodyPr>
+            <a:lstStyle/>
+            <a:p>
+              <a:r>
+                <a:rPr lang="es-419" dirty="0">
+                  <a:solidFill>
+                    <a:schemeClr val="bg1"/>
+                  </a:solidFill>
+                </a:rPr>
+                <a:t>Asistentes médicos</a:t>
+              </a:r>
+            </a:p>
+          </p:txBody>
+        </p:sp>
+        <p:sp>
+          <p:nvSpPr>
+            <p:cNvPr id="16" name="TextBox 15">
+              <a:extLst>
+                <a:ext uri="{FF2B5EF4-FFF2-40B4-BE49-F238E27FC236}">
+                  <a16:creationId xmlns:a16="http://schemas.microsoft.com/office/drawing/2014/main" id="{4FDBF0AE-12F1-05E9-2FB8-3F5A60449254}"/>
+                </a:ext>
+              </a:extLst>
+            </p:cNvPr>
+            <p:cNvSpPr txBox="1"/>
+            <p:nvPr/>
+          </p:nvSpPr>
+          <p:spPr>
+            <a:xfrm>
+              <a:off x="3988064" y="1390463"/>
+              <a:ext cx="1876925" cy="369332"/>
+            </a:xfrm>
+            <a:prstGeom prst="rect">
+              <a:avLst/>
+            </a:prstGeom>
+            <a:noFill/>
+          </p:spPr>
+          <p:txBody>
+            <a:bodyPr wrap="square" rtlCol="0">
+              <a:spAutoFit/>
+            </a:bodyPr>
+            <a:lstStyle/>
+            <a:p>
+              <a:r>
+                <a:rPr lang="es-419" dirty="0">
+                  <a:solidFill>
+                    <a:schemeClr val="bg1"/>
+                  </a:solidFill>
+                </a:rPr>
+                <a:t>IT</a:t>
+              </a:r>
+            </a:p>
+          </p:txBody>
+        </p:sp>
+        <p:sp>
+          <p:nvSpPr>
+            <p:cNvPr id="17" name="TextBox 16">
+              <a:extLst>
+                <a:ext uri="{FF2B5EF4-FFF2-40B4-BE49-F238E27FC236}">
+                  <a16:creationId xmlns:a16="http://schemas.microsoft.com/office/drawing/2014/main" id="{8E5A3E36-F346-709C-5F50-87CCB4E6DEFD}"/>
+                </a:ext>
+              </a:extLst>
+            </p:cNvPr>
+            <p:cNvSpPr txBox="1"/>
+            <p:nvPr/>
+          </p:nvSpPr>
+          <p:spPr>
+            <a:xfrm>
+              <a:off x="5419026" y="3408843"/>
+              <a:ext cx="1876925" cy="369332"/>
+            </a:xfrm>
+            <a:prstGeom prst="rect">
+              <a:avLst/>
+            </a:prstGeom>
+            <a:noFill/>
+          </p:spPr>
+          <p:txBody>
+            <a:bodyPr wrap="square" rtlCol="0">
+              <a:spAutoFit/>
+            </a:bodyPr>
+            <a:lstStyle/>
+            <a:p>
+              <a:r>
+                <a:rPr lang="es-419" dirty="0">
+                  <a:solidFill>
+                    <a:schemeClr val="bg1"/>
+                  </a:solidFill>
+                </a:rPr>
+                <a:t>Diseñadores</a:t>
+              </a:r>
+            </a:p>
+          </p:txBody>
+        </p:sp>
+        <p:sp>
+          <p:nvSpPr>
+            <p:cNvPr id="18" name="TextBox 17">
+              <a:extLst>
+                <a:ext uri="{FF2B5EF4-FFF2-40B4-BE49-F238E27FC236}">
+                  <a16:creationId xmlns:a16="http://schemas.microsoft.com/office/drawing/2014/main" id="{1A74C0B6-7841-DEC4-F0B8-66323D4371B8}"/>
+                </a:ext>
+              </a:extLst>
+            </p:cNvPr>
+            <p:cNvSpPr txBox="1"/>
+            <p:nvPr/>
+          </p:nvSpPr>
+          <p:spPr>
+            <a:xfrm>
+              <a:off x="3515224" y="4632572"/>
+              <a:ext cx="1876925" cy="369332"/>
+            </a:xfrm>
+            <a:prstGeom prst="rect">
+              <a:avLst/>
+            </a:prstGeom>
+            <a:noFill/>
+          </p:spPr>
+          <p:txBody>
+            <a:bodyPr wrap="square" rtlCol="0">
+              <a:spAutoFit/>
+            </a:bodyPr>
+            <a:lstStyle/>
+            <a:p>
+              <a:r>
+                <a:rPr lang="es-419" dirty="0">
+                  <a:solidFill>
+                    <a:schemeClr val="bg1"/>
+                  </a:solidFill>
+                </a:rPr>
+                <a:t>Pacientes</a:t>
+              </a:r>
+            </a:p>
+          </p:txBody>
+        </p:sp>
+        <p:sp>
+          <p:nvSpPr>
+            <p:cNvPr id="19" name="TextBox 18">
+              <a:extLst>
+                <a:ext uri="{FF2B5EF4-FFF2-40B4-BE49-F238E27FC236}">
+                  <a16:creationId xmlns:a16="http://schemas.microsoft.com/office/drawing/2014/main" id="{0892E338-0BD0-F51F-A475-00586A24C7F8}"/>
+                </a:ext>
+              </a:extLst>
+            </p:cNvPr>
+            <p:cNvSpPr txBox="1"/>
+            <p:nvPr/>
+          </p:nvSpPr>
+          <p:spPr>
+            <a:xfrm>
+              <a:off x="7425893" y="2002213"/>
+              <a:ext cx="1734148" cy="523220"/>
+            </a:xfrm>
+            <a:prstGeom prst="rect">
+              <a:avLst/>
+            </a:prstGeom>
+            <a:noFill/>
+          </p:spPr>
+          <p:txBody>
+            <a:bodyPr wrap="square" rtlCol="0">
+              <a:spAutoFit/>
+            </a:bodyPr>
+            <a:lstStyle/>
+            <a:p>
+              <a:r>
+                <a:rPr lang="es-419" sz="1400" dirty="0">
+                  <a:solidFill>
+                    <a:schemeClr val="bg1"/>
+                  </a:solidFill>
+                </a:rPr>
+                <a:t>Consulta frecuente en cada </a:t>
+              </a:r>
+              <a:r>
+                <a:rPr lang="es-419" sz="1400" dirty="0" err="1">
+                  <a:solidFill>
+                    <a:schemeClr val="bg1"/>
+                  </a:solidFill>
+                </a:rPr>
+                <a:t>feature</a:t>
+              </a:r>
+              <a:endParaRPr lang="es-419" sz="1400" dirty="0">
+                <a:solidFill>
+                  <a:schemeClr val="bg1"/>
+                </a:solidFill>
+              </a:endParaRPr>
+            </a:p>
+          </p:txBody>
+        </p:sp>
+        <p:sp>
+          <p:nvSpPr>
+            <p:cNvPr id="20" name="TextBox 19">
+              <a:extLst>
+                <a:ext uri="{FF2B5EF4-FFF2-40B4-BE49-F238E27FC236}">
+                  <a16:creationId xmlns:a16="http://schemas.microsoft.com/office/drawing/2014/main" id="{26387AC6-380D-7CE9-2BF4-C2F33BD2D740}"/>
+                </a:ext>
+              </a:extLst>
+            </p:cNvPr>
+            <p:cNvSpPr txBox="1"/>
+            <p:nvPr/>
+          </p:nvSpPr>
+          <p:spPr>
+            <a:xfrm>
+              <a:off x="7482842" y="3522724"/>
+              <a:ext cx="1734148" cy="523220"/>
+            </a:xfrm>
+            <a:prstGeom prst="rect">
+              <a:avLst/>
+            </a:prstGeom>
+            <a:noFill/>
+          </p:spPr>
+          <p:txBody>
+            <a:bodyPr wrap="square" rtlCol="0">
+              <a:spAutoFit/>
+            </a:bodyPr>
+            <a:lstStyle/>
+            <a:p>
+              <a:r>
+                <a:rPr lang="es-419" sz="1400" dirty="0">
+                  <a:solidFill>
+                    <a:schemeClr val="bg1"/>
+                  </a:solidFill>
+                </a:rPr>
+                <a:t>Pruebas (</a:t>
+              </a:r>
+              <a:r>
+                <a:rPr lang="es-419" sz="1400" dirty="0" err="1">
+                  <a:solidFill>
+                    <a:schemeClr val="bg1"/>
+                  </a:solidFill>
+                </a:rPr>
+                <a:t>feedback</a:t>
+              </a:r>
+              <a:r>
+                <a:rPr lang="es-419" sz="1400" dirty="0">
+                  <a:solidFill>
+                    <a:schemeClr val="bg1"/>
+                  </a:solidFill>
+                </a:rPr>
+                <a:t>) cada sprint</a:t>
+              </a:r>
+            </a:p>
+          </p:txBody>
+        </p:sp>
+        <p:sp>
+          <p:nvSpPr>
+            <p:cNvPr id="21" name="TextBox 20">
+              <a:extLst>
+                <a:ext uri="{FF2B5EF4-FFF2-40B4-BE49-F238E27FC236}">
+                  <a16:creationId xmlns:a16="http://schemas.microsoft.com/office/drawing/2014/main" id="{6778B4E1-200E-D313-130E-D4A9C351C4AE}"/>
+                </a:ext>
+              </a:extLst>
+            </p:cNvPr>
+            <p:cNvSpPr txBox="1"/>
+            <p:nvPr/>
+          </p:nvSpPr>
+          <p:spPr>
+            <a:xfrm>
+              <a:off x="5419025" y="2896977"/>
+              <a:ext cx="1734148" cy="523220"/>
+            </a:xfrm>
+            <a:prstGeom prst="rect">
+              <a:avLst/>
+            </a:prstGeom>
+            <a:noFill/>
+          </p:spPr>
+          <p:txBody>
+            <a:bodyPr wrap="square" rtlCol="0">
+              <a:spAutoFit/>
+            </a:bodyPr>
+            <a:lstStyle/>
+            <a:p>
+              <a:r>
+                <a:rPr lang="es-419" sz="1400" dirty="0">
+                  <a:solidFill>
+                    <a:schemeClr val="bg1"/>
+                  </a:solidFill>
+                </a:rPr>
+                <a:t>Pruebas (</a:t>
+              </a:r>
+              <a:r>
+                <a:rPr lang="es-419" sz="1400" dirty="0" err="1">
+                  <a:solidFill>
+                    <a:schemeClr val="bg1"/>
+                  </a:solidFill>
+                </a:rPr>
+                <a:t>feedback</a:t>
+              </a:r>
+              <a:r>
+                <a:rPr lang="es-419" sz="1400" dirty="0">
+                  <a:solidFill>
+                    <a:schemeClr val="bg1"/>
+                  </a:solidFill>
+                </a:rPr>
+                <a:t>) cada sprint</a:t>
+              </a:r>
+            </a:p>
+          </p:txBody>
+        </p:sp>
+        <p:sp>
+          <p:nvSpPr>
+            <p:cNvPr id="22" name="TextBox 21">
+              <a:extLst>
+                <a:ext uri="{FF2B5EF4-FFF2-40B4-BE49-F238E27FC236}">
+                  <a16:creationId xmlns:a16="http://schemas.microsoft.com/office/drawing/2014/main" id="{49544E0B-ED2D-0ACE-D28E-B435CCE08F9E}"/>
+                </a:ext>
+              </a:extLst>
+            </p:cNvPr>
+            <p:cNvSpPr txBox="1"/>
+            <p:nvPr/>
+          </p:nvSpPr>
+          <p:spPr>
+            <a:xfrm>
+              <a:off x="5419025" y="3673173"/>
+              <a:ext cx="1734148" cy="523220"/>
+            </a:xfrm>
+            <a:prstGeom prst="rect">
+              <a:avLst/>
+            </a:prstGeom>
+            <a:noFill/>
+          </p:spPr>
+          <p:txBody>
+            <a:bodyPr wrap="square" rtlCol="0">
+              <a:spAutoFit/>
+            </a:bodyPr>
+            <a:lstStyle/>
+            <a:p>
+              <a:r>
+                <a:rPr lang="es-419" sz="1400" dirty="0">
+                  <a:solidFill>
+                    <a:schemeClr val="bg1"/>
+                  </a:solidFill>
+                </a:rPr>
+                <a:t>Reunión cada inicio de sprint</a:t>
+              </a:r>
+            </a:p>
+          </p:txBody>
+        </p:sp>
+        <p:sp>
+          <p:nvSpPr>
+            <p:cNvPr id="23" name="TextBox 22">
+              <a:extLst>
+                <a:ext uri="{FF2B5EF4-FFF2-40B4-BE49-F238E27FC236}">
+                  <a16:creationId xmlns:a16="http://schemas.microsoft.com/office/drawing/2014/main" id="{EFC294C0-2E63-A0D5-33AE-1BC273AD725C}"/>
+                </a:ext>
+              </a:extLst>
+            </p:cNvPr>
+            <p:cNvSpPr txBox="1"/>
+            <p:nvPr/>
+          </p:nvSpPr>
+          <p:spPr>
+            <a:xfrm>
+              <a:off x="3586217" y="1704443"/>
+              <a:ext cx="1734148" cy="738664"/>
+            </a:xfrm>
+            <a:prstGeom prst="rect">
+              <a:avLst/>
+            </a:prstGeom>
+            <a:noFill/>
+          </p:spPr>
+          <p:txBody>
+            <a:bodyPr wrap="square" rtlCol="0">
+              <a:spAutoFit/>
+            </a:bodyPr>
+            <a:lstStyle/>
+            <a:p>
+              <a:r>
+                <a:rPr lang="es-419" sz="1400" dirty="0" err="1">
+                  <a:solidFill>
+                    <a:schemeClr val="bg1"/>
+                  </a:solidFill>
+                </a:rPr>
+                <a:t>Daily</a:t>
+              </a:r>
+              <a:r>
+                <a:rPr lang="es-419" sz="1400" dirty="0">
+                  <a:solidFill>
+                    <a:schemeClr val="bg1"/>
+                  </a:solidFill>
+                </a:rPr>
+                <a:t> scrum</a:t>
+              </a:r>
+            </a:p>
+            <a:p>
+              <a:r>
+                <a:rPr lang="es-419" sz="1400" dirty="0">
+                  <a:solidFill>
+                    <a:schemeClr val="bg1"/>
+                  </a:solidFill>
+                </a:rPr>
+                <a:t>Reunión con PM cada sprint</a:t>
+              </a:r>
+            </a:p>
+          </p:txBody>
+        </p:sp>
+        <p:sp>
+          <p:nvSpPr>
+            <p:cNvPr id="24" name="TextBox 23">
+              <a:extLst>
+                <a:ext uri="{FF2B5EF4-FFF2-40B4-BE49-F238E27FC236}">
+                  <a16:creationId xmlns:a16="http://schemas.microsoft.com/office/drawing/2014/main" id="{8B0A74D4-A37A-E64F-5503-87AA03FA9E12}"/>
+                </a:ext>
+              </a:extLst>
+            </p:cNvPr>
+            <p:cNvSpPr txBox="1"/>
+            <p:nvPr/>
+          </p:nvSpPr>
+          <p:spPr>
+            <a:xfrm>
+              <a:off x="5363278" y="1936866"/>
+              <a:ext cx="1734148" cy="307777"/>
+            </a:xfrm>
+            <a:prstGeom prst="rect">
+              <a:avLst/>
+            </a:prstGeom>
+            <a:noFill/>
+          </p:spPr>
+          <p:txBody>
+            <a:bodyPr wrap="square" rtlCol="0">
+              <a:spAutoFit/>
+            </a:bodyPr>
+            <a:lstStyle/>
+            <a:p>
+              <a:r>
+                <a:rPr lang="es-419" sz="1400" dirty="0">
+                  <a:solidFill>
+                    <a:schemeClr val="bg1"/>
+                  </a:solidFill>
+                </a:rPr>
+                <a:t>Reunión trimestral</a:t>
+              </a:r>
+            </a:p>
+          </p:txBody>
+        </p:sp>
+        <p:sp>
+          <p:nvSpPr>
+            <p:cNvPr id="25" name="TextBox 24">
+              <a:extLst>
+                <a:ext uri="{FF2B5EF4-FFF2-40B4-BE49-F238E27FC236}">
+                  <a16:creationId xmlns:a16="http://schemas.microsoft.com/office/drawing/2014/main" id="{D26CE86C-E2C9-978D-144C-3F3B3D1F24E7}"/>
+                </a:ext>
+              </a:extLst>
+            </p:cNvPr>
+            <p:cNvSpPr txBox="1"/>
+            <p:nvPr/>
+          </p:nvSpPr>
+          <p:spPr>
+            <a:xfrm>
+              <a:off x="7445143" y="5050456"/>
+              <a:ext cx="1734148" cy="307777"/>
+            </a:xfrm>
+            <a:prstGeom prst="rect">
+              <a:avLst/>
+            </a:prstGeom>
+            <a:noFill/>
+          </p:spPr>
+          <p:txBody>
+            <a:bodyPr wrap="square" rtlCol="0">
+              <a:spAutoFit/>
+            </a:bodyPr>
+            <a:lstStyle/>
+            <a:p>
+              <a:r>
+                <a:rPr lang="es-419" sz="1400" dirty="0">
+                  <a:solidFill>
+                    <a:schemeClr val="bg1"/>
+                  </a:solidFill>
+                </a:rPr>
+                <a:t>Mínimo esfuerzo</a:t>
+              </a:r>
+            </a:p>
+          </p:txBody>
+        </p:sp>
+        <p:sp>
+          <p:nvSpPr>
+            <p:cNvPr id="26" name="TextBox 25">
+              <a:extLst>
+                <a:ext uri="{FF2B5EF4-FFF2-40B4-BE49-F238E27FC236}">
+                  <a16:creationId xmlns:a16="http://schemas.microsoft.com/office/drawing/2014/main" id="{1AA9D7DA-23E8-0CF0-8835-49AEFDB546D9}"/>
+                </a:ext>
+              </a:extLst>
+            </p:cNvPr>
+            <p:cNvSpPr txBox="1"/>
+            <p:nvPr/>
+          </p:nvSpPr>
+          <p:spPr>
+            <a:xfrm>
+              <a:off x="5419025" y="5138298"/>
+              <a:ext cx="1734148" cy="307777"/>
+            </a:xfrm>
+            <a:prstGeom prst="rect">
+              <a:avLst/>
+            </a:prstGeom>
+            <a:noFill/>
+          </p:spPr>
+          <p:txBody>
+            <a:bodyPr wrap="square" rtlCol="0">
+              <a:spAutoFit/>
+            </a:bodyPr>
+            <a:lstStyle/>
+            <a:p>
+              <a:r>
+                <a:rPr lang="es-419" sz="1400" dirty="0">
+                  <a:solidFill>
+                    <a:schemeClr val="bg1"/>
+                  </a:solidFill>
+                </a:rPr>
+                <a:t>Mínimo esfuerzo</a:t>
+              </a:r>
+            </a:p>
+          </p:txBody>
+        </p:sp>
+        <p:sp>
+          <p:nvSpPr>
+            <p:cNvPr id="27" name="TextBox 26">
+              <a:extLst>
+                <a:ext uri="{FF2B5EF4-FFF2-40B4-BE49-F238E27FC236}">
+                  <a16:creationId xmlns:a16="http://schemas.microsoft.com/office/drawing/2014/main" id="{B4CEE705-8D82-7F1A-45CC-D71D387C13E9}"/>
+                </a:ext>
+              </a:extLst>
+            </p:cNvPr>
+            <p:cNvSpPr txBox="1"/>
+            <p:nvPr/>
+          </p:nvSpPr>
+          <p:spPr>
+            <a:xfrm>
+              <a:off x="3486353" y="4876688"/>
+              <a:ext cx="1734148" cy="523220"/>
+            </a:xfrm>
+            <a:prstGeom prst="rect">
+              <a:avLst/>
+            </a:prstGeom>
+            <a:noFill/>
+          </p:spPr>
+          <p:txBody>
+            <a:bodyPr wrap="square" rtlCol="0">
+              <a:spAutoFit/>
+            </a:bodyPr>
+            <a:lstStyle/>
+            <a:p>
+              <a:r>
+                <a:rPr lang="es-419" sz="1400" dirty="0">
+                  <a:solidFill>
+                    <a:schemeClr val="bg1"/>
+                  </a:solidFill>
+                </a:rPr>
+                <a:t>Requisitos mínimos (seguridad)</a:t>
+              </a:r>
+            </a:p>
+          </p:txBody>
+        </p:sp>
+        <p:sp>
+          <p:nvSpPr>
+            <p:cNvPr id="28" name="TextBox 27">
+              <a:extLst>
+                <a:ext uri="{FF2B5EF4-FFF2-40B4-BE49-F238E27FC236}">
+                  <a16:creationId xmlns:a16="http://schemas.microsoft.com/office/drawing/2014/main" id="{F42C8F5E-D278-EE62-50FC-5893935C57DC}"/>
+                </a:ext>
+              </a:extLst>
+            </p:cNvPr>
+            <p:cNvSpPr txBox="1"/>
+            <p:nvPr/>
+          </p:nvSpPr>
+          <p:spPr>
+            <a:xfrm>
+              <a:off x="3870168" y="5793429"/>
+              <a:ext cx="710222" cy="338554"/>
+            </a:xfrm>
+            <a:prstGeom prst="rect">
+              <a:avLst/>
+            </a:prstGeom>
+            <a:noFill/>
+          </p:spPr>
+          <p:txBody>
+            <a:bodyPr wrap="square" rtlCol="0">
+              <a:spAutoFit/>
+            </a:bodyPr>
+            <a:lstStyle/>
+            <a:p>
+              <a:r>
+                <a:rPr lang="es-419" sz="1600" dirty="0">
+                  <a:solidFill>
+                    <a:schemeClr val="bg1"/>
+                  </a:solidFill>
+                </a:rPr>
+                <a:t>bajo</a:t>
+              </a:r>
+            </a:p>
+          </p:txBody>
+        </p:sp>
+        <p:sp>
+          <p:nvSpPr>
+            <p:cNvPr id="29" name="TextBox 28">
+              <a:extLst>
+                <a:ext uri="{FF2B5EF4-FFF2-40B4-BE49-F238E27FC236}">
+                  <a16:creationId xmlns:a16="http://schemas.microsoft.com/office/drawing/2014/main" id="{D33A049B-4033-A291-35AD-88658AF587DB}"/>
+                </a:ext>
+              </a:extLst>
+            </p:cNvPr>
+            <p:cNvSpPr txBox="1"/>
+            <p:nvPr/>
+          </p:nvSpPr>
+          <p:spPr>
+            <a:xfrm>
+              <a:off x="5740256" y="5793429"/>
+              <a:ext cx="859831" cy="338554"/>
+            </a:xfrm>
+            <a:prstGeom prst="rect">
+              <a:avLst/>
+            </a:prstGeom>
+            <a:noFill/>
+          </p:spPr>
+          <p:txBody>
+            <a:bodyPr wrap="square" rtlCol="0">
+              <a:spAutoFit/>
+            </a:bodyPr>
+            <a:lstStyle/>
+            <a:p>
+              <a:r>
+                <a:rPr lang="es-419" sz="1600" dirty="0">
+                  <a:solidFill>
+                    <a:schemeClr val="bg1"/>
+                  </a:solidFill>
+                </a:rPr>
+                <a:t>medio</a:t>
+              </a:r>
+            </a:p>
+          </p:txBody>
+        </p:sp>
+        <p:sp>
+          <p:nvSpPr>
+            <p:cNvPr id="30" name="TextBox 29">
+              <a:extLst>
+                <a:ext uri="{FF2B5EF4-FFF2-40B4-BE49-F238E27FC236}">
+                  <a16:creationId xmlns:a16="http://schemas.microsoft.com/office/drawing/2014/main" id="{4E9F7D18-0F88-89F8-FABC-A37B58401DB0}"/>
+                </a:ext>
+              </a:extLst>
+            </p:cNvPr>
+            <p:cNvSpPr txBox="1"/>
+            <p:nvPr/>
+          </p:nvSpPr>
+          <p:spPr>
+            <a:xfrm>
+              <a:off x="7904300" y="5775266"/>
+              <a:ext cx="710222" cy="338554"/>
+            </a:xfrm>
+            <a:prstGeom prst="rect">
+              <a:avLst/>
+            </a:prstGeom>
+            <a:noFill/>
+          </p:spPr>
+          <p:txBody>
+            <a:bodyPr wrap="square" rtlCol="0">
+              <a:spAutoFit/>
+            </a:bodyPr>
+            <a:lstStyle/>
+            <a:p>
+              <a:r>
+                <a:rPr lang="es-419" sz="1600" dirty="0">
+                  <a:solidFill>
+                    <a:schemeClr val="bg1"/>
+                  </a:solidFill>
+                </a:rPr>
+                <a:t>alto</a:t>
+              </a:r>
+            </a:p>
+          </p:txBody>
+        </p:sp>
+        <p:sp>
+          <p:nvSpPr>
+            <p:cNvPr id="31" name="TextBox 30">
+              <a:extLst>
+                <a:ext uri="{FF2B5EF4-FFF2-40B4-BE49-F238E27FC236}">
+                  <a16:creationId xmlns:a16="http://schemas.microsoft.com/office/drawing/2014/main" id="{4087933C-60CC-8601-9208-8A0B3D42C3A5}"/>
+                </a:ext>
+              </a:extLst>
+            </p:cNvPr>
+            <p:cNvSpPr txBox="1"/>
+            <p:nvPr/>
+          </p:nvSpPr>
+          <p:spPr>
+            <a:xfrm rot="5400000">
+              <a:off x="2572983" y="4875520"/>
+              <a:ext cx="710222" cy="338554"/>
+            </a:xfrm>
+            <a:prstGeom prst="rect">
+              <a:avLst/>
+            </a:prstGeom>
+            <a:noFill/>
+          </p:spPr>
+          <p:txBody>
+            <a:bodyPr wrap="square" rtlCol="0">
+              <a:spAutoFit/>
+            </a:bodyPr>
+            <a:lstStyle/>
+            <a:p>
+              <a:r>
+                <a:rPr lang="es-419" sz="1600" dirty="0">
+                  <a:solidFill>
+                    <a:schemeClr val="bg1"/>
+                  </a:solidFill>
+                </a:rPr>
+                <a:t>bajo</a:t>
+              </a:r>
+            </a:p>
+          </p:txBody>
+        </p:sp>
+        <p:sp>
+          <p:nvSpPr>
+            <p:cNvPr id="32" name="TextBox 31">
+              <a:extLst>
+                <a:ext uri="{FF2B5EF4-FFF2-40B4-BE49-F238E27FC236}">
+                  <a16:creationId xmlns:a16="http://schemas.microsoft.com/office/drawing/2014/main" id="{88E90B15-B936-D3A7-3378-D24E2E5FDA28}"/>
+                </a:ext>
+              </a:extLst>
+            </p:cNvPr>
+            <p:cNvSpPr txBox="1"/>
+            <p:nvPr/>
+          </p:nvSpPr>
+          <p:spPr>
+            <a:xfrm rot="5400000">
+              <a:off x="2546393" y="3288493"/>
+              <a:ext cx="819105" cy="338554"/>
+            </a:xfrm>
+            <a:prstGeom prst="rect">
+              <a:avLst/>
+            </a:prstGeom>
+            <a:noFill/>
+          </p:spPr>
+          <p:txBody>
+            <a:bodyPr wrap="square" rtlCol="0">
+              <a:spAutoFit/>
+            </a:bodyPr>
+            <a:lstStyle/>
+            <a:p>
+              <a:r>
+                <a:rPr lang="es-419" sz="1600" dirty="0">
+                  <a:solidFill>
+                    <a:schemeClr val="bg1"/>
+                  </a:solidFill>
+                </a:rPr>
+                <a:t>medio</a:t>
+              </a:r>
+            </a:p>
+          </p:txBody>
+        </p:sp>
+        <p:sp>
+          <p:nvSpPr>
+            <p:cNvPr id="33" name="TextBox 32">
+              <a:extLst>
+                <a:ext uri="{FF2B5EF4-FFF2-40B4-BE49-F238E27FC236}">
+                  <a16:creationId xmlns:a16="http://schemas.microsoft.com/office/drawing/2014/main" id="{2EBF6B7D-4F86-3DDC-2A1E-24E95C2AF206}"/>
+                </a:ext>
+              </a:extLst>
+            </p:cNvPr>
+            <p:cNvSpPr txBox="1"/>
+            <p:nvPr/>
+          </p:nvSpPr>
+          <p:spPr>
+            <a:xfrm rot="5400000">
+              <a:off x="2605566" y="1798574"/>
+              <a:ext cx="710222" cy="338554"/>
+            </a:xfrm>
+            <a:prstGeom prst="rect">
+              <a:avLst/>
+            </a:prstGeom>
+            <a:noFill/>
+          </p:spPr>
+          <p:txBody>
+            <a:bodyPr wrap="square" rtlCol="0">
+              <a:spAutoFit/>
+            </a:bodyPr>
+            <a:lstStyle/>
+            <a:p>
+              <a:r>
+                <a:rPr lang="es-419" sz="1600" dirty="0">
+                  <a:solidFill>
+                    <a:schemeClr val="bg1"/>
+                  </a:solidFill>
+                </a:rPr>
+                <a:t>alto</a:t>
+              </a:r>
+            </a:p>
+          </p:txBody>
+        </p:sp>
+      </p:grpSp>
+    </p:spTree>
+    <p:extLst>
+      <p:ext uri="{BB962C8B-B14F-4D97-AF65-F5344CB8AC3E}">
+        <p14:creationId xmlns:p14="http://schemas.microsoft.com/office/powerpoint/2010/main" val="3348203995"/>
       </p:ext>
     </p:extLst>
   </p:cSld>
@@ -8474,6 +10125,2532 @@
 </p:sld>
 </file>
 
+<file path=ppt/slides/slide8.xml><?xml version="1.0" encoding="utf-8"?>
+<p:sld xmlns:a="http://schemas.openxmlformats.org/drawingml/2006/main" xmlns:r="http://schemas.openxmlformats.org/officeDocument/2006/relationships" xmlns:p="http://schemas.openxmlformats.org/presentationml/2006/main">
+  <p:cSld>
+    <p:spTree>
+      <p:nvGrpSpPr>
+        <p:cNvPr id="1" name=""/>
+        <p:cNvGrpSpPr/>
+        <p:nvPr/>
+      </p:nvGrpSpPr>
+      <p:grpSpPr>
+        <a:xfrm>
+          <a:off x="0" y="0"/>
+          <a:ext cx="0" cy="0"/>
+          <a:chOff x="0" y="0"/>
+          <a:chExt cx="0" cy="0"/>
+        </a:xfrm>
+      </p:grpSpPr>
+      <p:sp>
+        <p:nvSpPr>
+          <p:cNvPr id="2" name="TextBox 1">
+            <a:extLst>
+              <a:ext uri="{FF2B5EF4-FFF2-40B4-BE49-F238E27FC236}">
+                <a16:creationId xmlns:a16="http://schemas.microsoft.com/office/drawing/2014/main" id="{EC62BFFF-439F-41A7-28C6-E71FC77D884F}"/>
+              </a:ext>
+            </a:extLst>
+          </p:cNvPr>
+          <p:cNvSpPr txBox="1"/>
+          <p:nvPr/>
+        </p:nvSpPr>
+        <p:spPr>
+          <a:xfrm>
+            <a:off x="488533" y="285561"/>
+            <a:ext cx="6900963" cy="461665"/>
+          </a:xfrm>
+          <a:prstGeom prst="rect">
+            <a:avLst/>
+          </a:prstGeom>
+          <a:noFill/>
+        </p:spPr>
+        <p:txBody>
+          <a:bodyPr wrap="square" rtlCol="0">
+            <a:spAutoFit/>
+          </a:bodyPr>
+          <a:lstStyle/>
+          <a:p>
+            <a:r>
+              <a:rPr lang="es-419" sz="2400" dirty="0"/>
+              <a:t>Herramientas para Control de Calidad</a:t>
+            </a:r>
+          </a:p>
+        </p:txBody>
+      </p:sp>
+      <p:sp>
+        <p:nvSpPr>
+          <p:cNvPr id="3" name="TextBox 2">
+            <a:extLst>
+              <a:ext uri="{FF2B5EF4-FFF2-40B4-BE49-F238E27FC236}">
+                <a16:creationId xmlns:a16="http://schemas.microsoft.com/office/drawing/2014/main" id="{03AD77F1-9466-2FDF-3BCC-2489957EF2FB}"/>
+              </a:ext>
+            </a:extLst>
+          </p:cNvPr>
+          <p:cNvSpPr txBox="1"/>
+          <p:nvPr/>
+        </p:nvSpPr>
+        <p:spPr>
+          <a:xfrm>
+            <a:off x="1415371" y="1183094"/>
+            <a:ext cx="6900963" cy="646331"/>
+          </a:xfrm>
+          <a:prstGeom prst="rect">
+            <a:avLst/>
+          </a:prstGeom>
+          <a:noFill/>
+        </p:spPr>
+        <p:txBody>
+          <a:bodyPr wrap="square" rtlCol="0">
+            <a:spAutoFit/>
+          </a:bodyPr>
+          <a:lstStyle/>
+          <a:p>
+            <a:pPr marL="342900" indent="-342900">
+              <a:buAutoNum type="arabicPeriod"/>
+            </a:pPr>
+            <a:r>
+              <a:rPr lang="es-419" dirty="0"/>
+              <a:t>Gráfico de dispersión de métricas de modularidad del código fuente</a:t>
+            </a:r>
+          </a:p>
+          <a:p>
+            <a:pPr marL="742950" lvl="1" indent="-285750">
+              <a:buFontTx/>
+              <a:buChar char="-"/>
+            </a:pPr>
+            <a:r>
+              <a:rPr lang="es-419" dirty="0"/>
+              <a:t>Periodicidad: cada sprint o reléase oficial</a:t>
+            </a:r>
+          </a:p>
+        </p:txBody>
+      </p:sp>
+      <p:sp>
+        <p:nvSpPr>
+          <p:cNvPr id="4" name="TextBox 3">
+            <a:extLst>
+              <a:ext uri="{FF2B5EF4-FFF2-40B4-BE49-F238E27FC236}">
+                <a16:creationId xmlns:a16="http://schemas.microsoft.com/office/drawing/2014/main" id="{B0B6C110-F44A-1FCA-8EFC-6C52F0C2FFA8}"/>
+              </a:ext>
+            </a:extLst>
+          </p:cNvPr>
+          <p:cNvSpPr txBox="1"/>
+          <p:nvPr/>
+        </p:nvSpPr>
+        <p:spPr>
+          <a:xfrm>
+            <a:off x="1395746" y="2962361"/>
+            <a:ext cx="6900966" cy="646331"/>
+          </a:xfrm>
+          <a:prstGeom prst="rect">
+            <a:avLst/>
+          </a:prstGeom>
+          <a:noFill/>
+        </p:spPr>
+        <p:txBody>
+          <a:bodyPr wrap="square" rtlCol="0">
+            <a:spAutoFit/>
+          </a:bodyPr>
+          <a:lstStyle/>
+          <a:p>
+            <a:r>
+              <a:rPr lang="es-419" dirty="0"/>
+              <a:t>2.    Gráfico de control de métricas de mantenimiento del backlog</a:t>
+            </a:r>
+          </a:p>
+          <a:p>
+            <a:pPr marL="742950" lvl="1" indent="-285750">
+              <a:buFontTx/>
+              <a:buChar char="-"/>
+            </a:pPr>
+            <a:r>
+              <a:rPr lang="es-419" dirty="0"/>
+              <a:t>Periodicidad: cada semana de desarrollo</a:t>
+            </a:r>
+          </a:p>
+        </p:txBody>
+      </p:sp>
+      <p:sp>
+        <p:nvSpPr>
+          <p:cNvPr id="5" name="TextBox 4">
+            <a:extLst>
+              <a:ext uri="{FF2B5EF4-FFF2-40B4-BE49-F238E27FC236}">
+                <a16:creationId xmlns:a16="http://schemas.microsoft.com/office/drawing/2014/main" id="{599EB59F-4C17-1818-03B4-8D44E5334E7E}"/>
+              </a:ext>
+            </a:extLst>
+          </p:cNvPr>
+          <p:cNvSpPr txBox="1"/>
+          <p:nvPr/>
+        </p:nvSpPr>
+        <p:spPr>
+          <a:xfrm>
+            <a:off x="1415371" y="5213241"/>
+            <a:ext cx="8500416" cy="646331"/>
+          </a:xfrm>
+          <a:prstGeom prst="rect">
+            <a:avLst/>
+          </a:prstGeom>
+          <a:noFill/>
+        </p:spPr>
+        <p:txBody>
+          <a:bodyPr wrap="square" rtlCol="0">
+            <a:spAutoFit/>
+          </a:bodyPr>
+          <a:lstStyle/>
+          <a:p>
+            <a:r>
+              <a:rPr lang="es-419" dirty="0"/>
+              <a:t>3.    Hoja de verificación para fallas del sistema durante pruebas de usuario</a:t>
+            </a:r>
+          </a:p>
+          <a:p>
+            <a:pPr marL="742950" lvl="1" indent="-285750">
+              <a:buFontTx/>
+              <a:buChar char="-"/>
+            </a:pPr>
+            <a:r>
+              <a:rPr lang="es-419" dirty="0"/>
+              <a:t>Periodicidad: cada sprint, en prueba de usuario</a:t>
+            </a:r>
+          </a:p>
+        </p:txBody>
+      </p:sp>
+      <p:grpSp>
+        <p:nvGrpSpPr>
+          <p:cNvPr id="56" name="Group 55">
+            <a:extLst>
+              <a:ext uri="{FF2B5EF4-FFF2-40B4-BE49-F238E27FC236}">
+                <a16:creationId xmlns:a16="http://schemas.microsoft.com/office/drawing/2014/main" id="{B60FEA94-820B-1A5D-BA72-D65FE528C93E}"/>
+              </a:ext>
+            </a:extLst>
+          </p:cNvPr>
+          <p:cNvGrpSpPr/>
+          <p:nvPr/>
+        </p:nvGrpSpPr>
+        <p:grpSpPr>
+          <a:xfrm>
+            <a:off x="8716102" y="1051960"/>
+            <a:ext cx="3263377" cy="4115906"/>
+            <a:chOff x="8716102" y="1051960"/>
+            <a:chExt cx="3263377" cy="4115906"/>
+          </a:xfrm>
+        </p:grpSpPr>
+        <p:sp>
+          <p:nvSpPr>
+            <p:cNvPr id="54" name="Rectangle 53">
+              <a:extLst>
+                <a:ext uri="{FF2B5EF4-FFF2-40B4-BE49-F238E27FC236}">
+                  <a16:creationId xmlns:a16="http://schemas.microsoft.com/office/drawing/2014/main" id="{1498410E-4CCA-E565-5918-B54A7D184F92}"/>
+                </a:ext>
+              </a:extLst>
+            </p:cNvPr>
+            <p:cNvSpPr/>
+            <p:nvPr/>
+          </p:nvSpPr>
+          <p:spPr>
+            <a:xfrm>
+              <a:off x="9082354" y="3788664"/>
+              <a:ext cx="2684759" cy="412450"/>
+            </a:xfrm>
+            <a:prstGeom prst="rect">
+              <a:avLst/>
+            </a:prstGeom>
+            <a:solidFill>
+              <a:schemeClr val="accent4">
+                <a:lumMod val="60000"/>
+                <a:lumOff val="40000"/>
+              </a:schemeClr>
+            </a:solidFill>
+            <a:ln>
+              <a:noFill/>
+            </a:ln>
+          </p:spPr>
+          <p:style>
+            <a:lnRef idx="2">
+              <a:schemeClr val="accent4">
+                <a:shade val="50000"/>
+              </a:schemeClr>
+            </a:lnRef>
+            <a:fillRef idx="1">
+              <a:schemeClr val="accent4"/>
+            </a:fillRef>
+            <a:effectRef idx="0">
+              <a:schemeClr val="accent4"/>
+            </a:effectRef>
+            <a:fontRef idx="minor">
+              <a:schemeClr val="lt1"/>
+            </a:fontRef>
+          </p:style>
+          <p:txBody>
+            <a:bodyPr rtlCol="0" anchor="ctr"/>
+            <a:lstStyle/>
+            <a:p>
+              <a:pPr algn="ctr"/>
+              <a:endParaRPr lang="es-419"/>
+            </a:p>
+          </p:txBody>
+        </p:sp>
+        <p:cxnSp>
+          <p:nvCxnSpPr>
+            <p:cNvPr id="6" name="Straight Arrow Connector 5">
+              <a:extLst>
+                <a:ext uri="{FF2B5EF4-FFF2-40B4-BE49-F238E27FC236}">
+                  <a16:creationId xmlns:a16="http://schemas.microsoft.com/office/drawing/2014/main" id="{397765DA-CF36-4C04-1144-11D30C11CBFE}"/>
+                </a:ext>
+              </a:extLst>
+            </p:cNvPr>
+            <p:cNvCxnSpPr>
+              <a:cxnSpLocks/>
+            </p:cNvCxnSpPr>
+            <p:nvPr/>
+          </p:nvCxnSpPr>
+          <p:spPr>
+            <a:xfrm flipV="1">
+              <a:off x="9082354" y="1051960"/>
+              <a:ext cx="0" cy="1866116"/>
+            </a:xfrm>
+            <a:prstGeom prst="straightConnector1">
+              <a:avLst/>
+            </a:prstGeom>
+            <a:ln>
+              <a:tailEnd type="triangle"/>
+            </a:ln>
+          </p:spPr>
+          <p:style>
+            <a:lnRef idx="3">
+              <a:schemeClr val="dk1"/>
+            </a:lnRef>
+            <a:fillRef idx="0">
+              <a:schemeClr val="dk1"/>
+            </a:fillRef>
+            <a:effectRef idx="2">
+              <a:schemeClr val="dk1"/>
+            </a:effectRef>
+            <a:fontRef idx="minor">
+              <a:schemeClr val="tx1"/>
+            </a:fontRef>
+          </p:style>
+        </p:cxnSp>
+        <p:cxnSp>
+          <p:nvCxnSpPr>
+            <p:cNvPr id="7" name="Straight Arrow Connector 6">
+              <a:extLst>
+                <a:ext uri="{FF2B5EF4-FFF2-40B4-BE49-F238E27FC236}">
+                  <a16:creationId xmlns:a16="http://schemas.microsoft.com/office/drawing/2014/main" id="{A89110A3-902E-2217-C53C-93F0CE4F9CDC}"/>
+                </a:ext>
+              </a:extLst>
+            </p:cNvPr>
+            <p:cNvCxnSpPr>
+              <a:cxnSpLocks/>
+            </p:cNvCxnSpPr>
+            <p:nvPr/>
+          </p:nvCxnSpPr>
+          <p:spPr>
+            <a:xfrm>
+              <a:off x="8949198" y="2775855"/>
+              <a:ext cx="2381567" cy="0"/>
+            </a:xfrm>
+            <a:prstGeom prst="straightConnector1">
+              <a:avLst/>
+            </a:prstGeom>
+            <a:ln>
+              <a:tailEnd type="triangle"/>
+            </a:ln>
+          </p:spPr>
+          <p:style>
+            <a:lnRef idx="3">
+              <a:schemeClr val="dk1"/>
+            </a:lnRef>
+            <a:fillRef idx="0">
+              <a:schemeClr val="dk1"/>
+            </a:fillRef>
+            <a:effectRef idx="2">
+              <a:schemeClr val="dk1"/>
+            </a:effectRef>
+            <a:fontRef idx="minor">
+              <a:schemeClr val="tx1"/>
+            </a:fontRef>
+          </p:style>
+        </p:cxnSp>
+        <p:sp>
+          <p:nvSpPr>
+            <p:cNvPr id="8" name="Oval 7">
+              <a:extLst>
+                <a:ext uri="{FF2B5EF4-FFF2-40B4-BE49-F238E27FC236}">
+                  <a16:creationId xmlns:a16="http://schemas.microsoft.com/office/drawing/2014/main" id="{454C40D2-354D-A306-79E0-36A7D3854D0C}"/>
+                </a:ext>
+              </a:extLst>
+            </p:cNvPr>
+            <p:cNvSpPr/>
+            <p:nvPr/>
+          </p:nvSpPr>
+          <p:spPr>
+            <a:xfrm>
+              <a:off x="9896162" y="1414706"/>
+              <a:ext cx="592924" cy="570312"/>
+            </a:xfrm>
+            <a:prstGeom prst="ellipse">
+              <a:avLst/>
+            </a:prstGeom>
+          </p:spPr>
+          <p:style>
+            <a:lnRef idx="2">
+              <a:schemeClr val="accent4">
+                <a:shade val="50000"/>
+              </a:schemeClr>
+            </a:lnRef>
+            <a:fillRef idx="1">
+              <a:schemeClr val="accent4"/>
+            </a:fillRef>
+            <a:effectRef idx="0">
+              <a:schemeClr val="accent4"/>
+            </a:effectRef>
+            <a:fontRef idx="minor">
+              <a:schemeClr val="lt1"/>
+            </a:fontRef>
+          </p:style>
+          <p:txBody>
+            <a:bodyPr rtlCol="0" anchor="ctr"/>
+            <a:lstStyle/>
+            <a:p>
+              <a:pPr algn="ctr"/>
+              <a:endParaRPr lang="es-419"/>
+            </a:p>
+          </p:txBody>
+        </p:sp>
+        <p:sp>
+          <p:nvSpPr>
+            <p:cNvPr id="9" name="Oval 8">
+              <a:extLst>
+                <a:ext uri="{FF2B5EF4-FFF2-40B4-BE49-F238E27FC236}">
+                  <a16:creationId xmlns:a16="http://schemas.microsoft.com/office/drawing/2014/main" id="{01DC6DEF-D65C-A9BF-6BC2-5A8187E54CEA}"/>
+                </a:ext>
+              </a:extLst>
+            </p:cNvPr>
+            <p:cNvSpPr/>
+            <p:nvPr/>
+          </p:nvSpPr>
+          <p:spPr>
+            <a:xfrm>
+              <a:off x="9361238" y="2257192"/>
+              <a:ext cx="256040" cy="246489"/>
+            </a:xfrm>
+            <a:prstGeom prst="ellipse">
+              <a:avLst/>
+            </a:prstGeom>
+          </p:spPr>
+          <p:style>
+            <a:lnRef idx="2">
+              <a:schemeClr val="accent6">
+                <a:shade val="50000"/>
+              </a:schemeClr>
+            </a:lnRef>
+            <a:fillRef idx="1">
+              <a:schemeClr val="accent6"/>
+            </a:fillRef>
+            <a:effectRef idx="0">
+              <a:schemeClr val="accent6"/>
+            </a:effectRef>
+            <a:fontRef idx="minor">
+              <a:schemeClr val="lt1"/>
+            </a:fontRef>
+          </p:style>
+          <p:txBody>
+            <a:bodyPr rtlCol="0" anchor="ctr"/>
+            <a:lstStyle/>
+            <a:p>
+              <a:pPr algn="ctr"/>
+              <a:endParaRPr lang="es-419" dirty="0"/>
+            </a:p>
+          </p:txBody>
+        </p:sp>
+        <p:sp>
+          <p:nvSpPr>
+            <p:cNvPr id="10" name="Oval 9">
+              <a:extLst>
+                <a:ext uri="{FF2B5EF4-FFF2-40B4-BE49-F238E27FC236}">
+                  <a16:creationId xmlns:a16="http://schemas.microsoft.com/office/drawing/2014/main" id="{021F47FE-B584-A351-0052-14054249F9A0}"/>
+                </a:ext>
+              </a:extLst>
+            </p:cNvPr>
+            <p:cNvSpPr/>
+            <p:nvPr/>
+          </p:nvSpPr>
+          <p:spPr>
+            <a:xfrm>
+              <a:off x="10641968" y="2136337"/>
+              <a:ext cx="411498" cy="367344"/>
+            </a:xfrm>
+            <a:prstGeom prst="ellipse">
+              <a:avLst/>
+            </a:prstGeom>
+          </p:spPr>
+          <p:style>
+            <a:lnRef idx="2">
+              <a:schemeClr val="accent2">
+                <a:shade val="50000"/>
+              </a:schemeClr>
+            </a:lnRef>
+            <a:fillRef idx="1">
+              <a:schemeClr val="accent2"/>
+            </a:fillRef>
+            <a:effectRef idx="0">
+              <a:schemeClr val="accent2"/>
+            </a:effectRef>
+            <a:fontRef idx="minor">
+              <a:schemeClr val="lt1"/>
+            </a:fontRef>
+          </p:style>
+          <p:txBody>
+            <a:bodyPr rtlCol="0" anchor="ctr"/>
+            <a:lstStyle/>
+            <a:p>
+              <a:pPr algn="ctr"/>
+              <a:endParaRPr lang="es-419"/>
+            </a:p>
+          </p:txBody>
+        </p:sp>
+        <p:cxnSp>
+          <p:nvCxnSpPr>
+            <p:cNvPr id="16" name="Straight Arrow Connector 15">
+              <a:extLst>
+                <a:ext uri="{FF2B5EF4-FFF2-40B4-BE49-F238E27FC236}">
+                  <a16:creationId xmlns:a16="http://schemas.microsoft.com/office/drawing/2014/main" id="{7E87C660-4C6A-8F4E-606F-AC1E6CD08075}"/>
+                </a:ext>
+              </a:extLst>
+            </p:cNvPr>
+            <p:cNvCxnSpPr>
+              <a:cxnSpLocks/>
+            </p:cNvCxnSpPr>
+            <p:nvPr/>
+          </p:nvCxnSpPr>
+          <p:spPr>
+            <a:xfrm>
+              <a:off x="9915787" y="1723358"/>
+              <a:ext cx="555834" cy="0"/>
+            </a:xfrm>
+            <a:prstGeom prst="straightConnector1">
+              <a:avLst/>
+            </a:prstGeom>
+            <a:ln>
+              <a:headEnd type="triangle"/>
+              <a:tailEnd type="triangle"/>
+            </a:ln>
+          </p:spPr>
+          <p:style>
+            <a:lnRef idx="3">
+              <a:schemeClr val="dk1"/>
+            </a:lnRef>
+            <a:fillRef idx="0">
+              <a:schemeClr val="dk1"/>
+            </a:fillRef>
+            <a:effectRef idx="2">
+              <a:schemeClr val="dk1"/>
+            </a:effectRef>
+            <a:fontRef idx="minor">
+              <a:schemeClr val="tx1"/>
+            </a:fontRef>
+          </p:style>
+        </p:cxnSp>
+        <p:sp>
+          <p:nvSpPr>
+            <p:cNvPr id="18" name="TextBox 17">
+              <a:extLst>
+                <a:ext uri="{FF2B5EF4-FFF2-40B4-BE49-F238E27FC236}">
+                  <a16:creationId xmlns:a16="http://schemas.microsoft.com/office/drawing/2014/main" id="{6C83FAFD-31F3-4128-BCCA-1E43AE2887B3}"/>
+                </a:ext>
+              </a:extLst>
+            </p:cNvPr>
+            <p:cNvSpPr txBox="1"/>
+            <p:nvPr/>
+          </p:nvSpPr>
+          <p:spPr>
+            <a:xfrm>
+              <a:off x="9222282" y="2762171"/>
+              <a:ext cx="2108483" cy="338554"/>
+            </a:xfrm>
+            <a:prstGeom prst="rect">
+              <a:avLst/>
+            </a:prstGeom>
+            <a:noFill/>
+          </p:spPr>
+          <p:txBody>
+            <a:bodyPr wrap="square" rtlCol="0">
+              <a:spAutoFit/>
+            </a:bodyPr>
+            <a:lstStyle/>
+            <a:p>
+              <a:r>
+                <a:rPr lang="es-419" sz="1600" dirty="0"/>
+                <a:t>Tiempo de desarrollo</a:t>
+              </a:r>
+            </a:p>
+          </p:txBody>
+        </p:sp>
+        <p:sp>
+          <p:nvSpPr>
+            <p:cNvPr id="19" name="TextBox 18">
+              <a:extLst>
+                <a:ext uri="{FF2B5EF4-FFF2-40B4-BE49-F238E27FC236}">
+                  <a16:creationId xmlns:a16="http://schemas.microsoft.com/office/drawing/2014/main" id="{8662D2EA-EA43-46BB-74E7-8E02D06765CA}"/>
+                </a:ext>
+              </a:extLst>
+            </p:cNvPr>
+            <p:cNvSpPr txBox="1"/>
+            <p:nvPr/>
+          </p:nvSpPr>
+          <p:spPr>
+            <a:xfrm rot="5400000">
+              <a:off x="8275248" y="1754027"/>
+              <a:ext cx="1275658" cy="338554"/>
+            </a:xfrm>
+            <a:prstGeom prst="rect">
+              <a:avLst/>
+            </a:prstGeom>
+            <a:noFill/>
+          </p:spPr>
+          <p:txBody>
+            <a:bodyPr wrap="square" rtlCol="0">
+              <a:spAutoFit/>
+            </a:bodyPr>
+            <a:lstStyle/>
+            <a:p>
+              <a:r>
+                <a:rPr lang="es-419" sz="1600" dirty="0"/>
+                <a:t>Modularidad</a:t>
+              </a:r>
+            </a:p>
+          </p:txBody>
+        </p:sp>
+        <p:sp>
+          <p:nvSpPr>
+            <p:cNvPr id="20" name="TextBox 19">
+              <a:extLst>
+                <a:ext uri="{FF2B5EF4-FFF2-40B4-BE49-F238E27FC236}">
+                  <a16:creationId xmlns:a16="http://schemas.microsoft.com/office/drawing/2014/main" id="{7C68330C-7F8E-EAB8-9E72-6A5A32ED762A}"/>
+                </a:ext>
+              </a:extLst>
+            </p:cNvPr>
+            <p:cNvSpPr txBox="1"/>
+            <p:nvPr/>
+          </p:nvSpPr>
+          <p:spPr>
+            <a:xfrm>
+              <a:off x="10541189" y="1395286"/>
+              <a:ext cx="1438290" cy="584775"/>
+            </a:xfrm>
+            <a:prstGeom prst="rect">
+              <a:avLst/>
+            </a:prstGeom>
+            <a:noFill/>
+          </p:spPr>
+          <p:txBody>
+            <a:bodyPr wrap="square" rtlCol="0">
+              <a:spAutoFit/>
+            </a:bodyPr>
+            <a:lstStyle/>
+            <a:p>
+              <a:r>
+                <a:rPr lang="es-419" sz="1600" dirty="0"/>
+                <a:t>Diámetro: </a:t>
+              </a:r>
+              <a:r>
+                <a:rPr lang="es-419" sz="1600" dirty="0" err="1"/>
+                <a:t>LoC</a:t>
+              </a:r>
+              <a:r>
+                <a:rPr lang="es-419" sz="1600" dirty="0"/>
+                <a:t> (</a:t>
+              </a:r>
+              <a:r>
+                <a:rPr lang="es-419" sz="1600" dirty="0" err="1"/>
+                <a:t>Lines</a:t>
+              </a:r>
+              <a:r>
+                <a:rPr lang="es-419" sz="1600" dirty="0"/>
+                <a:t> </a:t>
+              </a:r>
+              <a:r>
+                <a:rPr lang="es-419" sz="1600" dirty="0" err="1"/>
+                <a:t>of</a:t>
+              </a:r>
+              <a:r>
+                <a:rPr lang="es-419" sz="1600" dirty="0"/>
+                <a:t> </a:t>
+              </a:r>
+              <a:r>
+                <a:rPr lang="es-419" sz="1600" dirty="0" err="1"/>
+                <a:t>Code</a:t>
+              </a:r>
+              <a:r>
+                <a:rPr lang="es-419" sz="1600" dirty="0"/>
+                <a:t>)</a:t>
+              </a:r>
+            </a:p>
+          </p:txBody>
+        </p:sp>
+        <p:cxnSp>
+          <p:nvCxnSpPr>
+            <p:cNvPr id="21" name="Straight Arrow Connector 20">
+              <a:extLst>
+                <a:ext uri="{FF2B5EF4-FFF2-40B4-BE49-F238E27FC236}">
+                  <a16:creationId xmlns:a16="http://schemas.microsoft.com/office/drawing/2014/main" id="{5E71E29A-ADDF-F358-74B6-A01042EF596B}"/>
+                </a:ext>
+              </a:extLst>
+            </p:cNvPr>
+            <p:cNvCxnSpPr>
+              <a:cxnSpLocks/>
+            </p:cNvCxnSpPr>
+            <p:nvPr/>
+          </p:nvCxnSpPr>
+          <p:spPr>
+            <a:xfrm flipV="1">
+              <a:off x="9072772" y="3443903"/>
+              <a:ext cx="0" cy="1543574"/>
+            </a:xfrm>
+            <a:prstGeom prst="straightConnector1">
+              <a:avLst/>
+            </a:prstGeom>
+            <a:ln>
+              <a:tailEnd type="triangle"/>
+            </a:ln>
+          </p:spPr>
+          <p:style>
+            <a:lnRef idx="3">
+              <a:schemeClr val="dk1"/>
+            </a:lnRef>
+            <a:fillRef idx="0">
+              <a:schemeClr val="dk1"/>
+            </a:fillRef>
+            <a:effectRef idx="2">
+              <a:schemeClr val="dk1"/>
+            </a:effectRef>
+            <a:fontRef idx="minor">
+              <a:schemeClr val="tx1"/>
+            </a:fontRef>
+          </p:style>
+        </p:cxnSp>
+        <p:cxnSp>
+          <p:nvCxnSpPr>
+            <p:cNvPr id="22" name="Straight Connector 21">
+              <a:extLst>
+                <a:ext uri="{FF2B5EF4-FFF2-40B4-BE49-F238E27FC236}">
+                  <a16:creationId xmlns:a16="http://schemas.microsoft.com/office/drawing/2014/main" id="{7D3D3F5F-137B-572D-D0F7-C982F0F88242}"/>
+                </a:ext>
+              </a:extLst>
+            </p:cNvPr>
+            <p:cNvCxnSpPr>
+              <a:cxnSpLocks/>
+            </p:cNvCxnSpPr>
+            <p:nvPr/>
+          </p:nvCxnSpPr>
+          <p:spPr>
+            <a:xfrm>
+              <a:off x="8893914" y="4856283"/>
+              <a:ext cx="2929311" cy="0"/>
+            </a:xfrm>
+            <a:prstGeom prst="line">
+              <a:avLst/>
+            </a:prstGeom>
+            <a:ln>
+              <a:headEnd type="none" w="med" len="med"/>
+              <a:tailEnd type="none" w="med" len="med"/>
+            </a:ln>
+          </p:spPr>
+          <p:style>
+            <a:lnRef idx="3">
+              <a:schemeClr val="accent6"/>
+            </a:lnRef>
+            <a:fillRef idx="0">
+              <a:schemeClr val="accent6"/>
+            </a:fillRef>
+            <a:effectRef idx="2">
+              <a:schemeClr val="accent6"/>
+            </a:effectRef>
+            <a:fontRef idx="minor">
+              <a:schemeClr val="tx1"/>
+            </a:fontRef>
+          </p:style>
+        </p:cxnSp>
+        <p:sp>
+          <p:nvSpPr>
+            <p:cNvPr id="23" name="Oval 22">
+              <a:extLst>
+                <a:ext uri="{FF2B5EF4-FFF2-40B4-BE49-F238E27FC236}">
+                  <a16:creationId xmlns:a16="http://schemas.microsoft.com/office/drawing/2014/main" id="{37A4C958-95FE-0852-9943-2764431BDD76}"/>
+                </a:ext>
+              </a:extLst>
+            </p:cNvPr>
+            <p:cNvSpPr/>
+            <p:nvPr/>
+          </p:nvSpPr>
+          <p:spPr>
+            <a:xfrm flipV="1">
+              <a:off x="9297870" y="4301146"/>
+              <a:ext cx="173246" cy="187686"/>
+            </a:xfrm>
+            <a:prstGeom prst="ellipse">
+              <a:avLst/>
+            </a:prstGeom>
+            <a:solidFill>
+              <a:srgbClr val="FF0000"/>
+            </a:solidFill>
+          </p:spPr>
+          <p:style>
+            <a:lnRef idx="2">
+              <a:schemeClr val="accent2">
+                <a:shade val="50000"/>
+              </a:schemeClr>
+            </a:lnRef>
+            <a:fillRef idx="1">
+              <a:schemeClr val="accent2"/>
+            </a:fillRef>
+            <a:effectRef idx="0">
+              <a:schemeClr val="accent2"/>
+            </a:effectRef>
+            <a:fontRef idx="minor">
+              <a:schemeClr val="lt1"/>
+            </a:fontRef>
+          </p:style>
+          <p:txBody>
+            <a:bodyPr rtlCol="0" anchor="ctr"/>
+            <a:lstStyle/>
+            <a:p>
+              <a:pPr algn="ctr"/>
+              <a:endParaRPr lang="es-419"/>
+            </a:p>
+          </p:txBody>
+        </p:sp>
+        <p:sp>
+          <p:nvSpPr>
+            <p:cNvPr id="24" name="Oval 23">
+              <a:extLst>
+                <a:ext uri="{FF2B5EF4-FFF2-40B4-BE49-F238E27FC236}">
+                  <a16:creationId xmlns:a16="http://schemas.microsoft.com/office/drawing/2014/main" id="{20C0B4E4-0868-7460-BECB-588FA730EF65}"/>
+                </a:ext>
+              </a:extLst>
+            </p:cNvPr>
+            <p:cNvSpPr/>
+            <p:nvPr/>
+          </p:nvSpPr>
+          <p:spPr>
+            <a:xfrm flipV="1">
+              <a:off x="10200424" y="3930664"/>
+              <a:ext cx="173246" cy="187686"/>
+            </a:xfrm>
+            <a:prstGeom prst="ellipse">
+              <a:avLst/>
+            </a:prstGeom>
+            <a:solidFill>
+              <a:srgbClr val="FF0000"/>
+            </a:solidFill>
+          </p:spPr>
+          <p:style>
+            <a:lnRef idx="2">
+              <a:schemeClr val="accent2">
+                <a:shade val="50000"/>
+              </a:schemeClr>
+            </a:lnRef>
+            <a:fillRef idx="1">
+              <a:schemeClr val="accent2"/>
+            </a:fillRef>
+            <a:effectRef idx="0">
+              <a:schemeClr val="accent2"/>
+            </a:effectRef>
+            <a:fontRef idx="minor">
+              <a:schemeClr val="lt1"/>
+            </a:fontRef>
+          </p:style>
+          <p:txBody>
+            <a:bodyPr rtlCol="0" anchor="ctr"/>
+            <a:lstStyle/>
+            <a:p>
+              <a:pPr algn="ctr"/>
+              <a:endParaRPr lang="es-419"/>
+            </a:p>
+          </p:txBody>
+        </p:sp>
+        <p:sp>
+          <p:nvSpPr>
+            <p:cNvPr id="25" name="Oval 24">
+              <a:extLst>
+                <a:ext uri="{FF2B5EF4-FFF2-40B4-BE49-F238E27FC236}">
+                  <a16:creationId xmlns:a16="http://schemas.microsoft.com/office/drawing/2014/main" id="{AC21F4B1-B297-C351-94FA-5615236BFE8E}"/>
+                </a:ext>
+              </a:extLst>
+            </p:cNvPr>
+            <p:cNvSpPr/>
+            <p:nvPr/>
+          </p:nvSpPr>
+          <p:spPr>
+            <a:xfrm flipV="1">
+              <a:off x="11091907" y="3552601"/>
+              <a:ext cx="173246" cy="187686"/>
+            </a:xfrm>
+            <a:prstGeom prst="ellipse">
+              <a:avLst/>
+            </a:prstGeom>
+            <a:solidFill>
+              <a:srgbClr val="FF0000"/>
+            </a:solidFill>
+          </p:spPr>
+          <p:style>
+            <a:lnRef idx="2">
+              <a:schemeClr val="accent2">
+                <a:shade val="50000"/>
+              </a:schemeClr>
+            </a:lnRef>
+            <a:fillRef idx="1">
+              <a:schemeClr val="accent2"/>
+            </a:fillRef>
+            <a:effectRef idx="0">
+              <a:schemeClr val="accent2"/>
+            </a:effectRef>
+            <a:fontRef idx="minor">
+              <a:schemeClr val="lt1"/>
+            </a:fontRef>
+          </p:style>
+          <p:txBody>
+            <a:bodyPr rtlCol="0" anchor="ctr"/>
+            <a:lstStyle/>
+            <a:p>
+              <a:pPr algn="ctr"/>
+              <a:endParaRPr lang="es-419"/>
+            </a:p>
+          </p:txBody>
+        </p:sp>
+        <p:cxnSp>
+          <p:nvCxnSpPr>
+            <p:cNvPr id="28" name="Straight Connector 27">
+              <a:extLst>
+                <a:ext uri="{FF2B5EF4-FFF2-40B4-BE49-F238E27FC236}">
+                  <a16:creationId xmlns:a16="http://schemas.microsoft.com/office/drawing/2014/main" id="{51ECBDBE-CC78-F7B4-2520-4B26646D4B01}"/>
+                </a:ext>
+              </a:extLst>
+            </p:cNvPr>
+            <p:cNvCxnSpPr>
+              <a:cxnSpLocks/>
+              <a:endCxn id="23" idx="1"/>
+            </p:cNvCxnSpPr>
+            <p:nvPr/>
+          </p:nvCxnSpPr>
+          <p:spPr>
+            <a:xfrm flipV="1">
+              <a:off x="9082354" y="4461346"/>
+              <a:ext cx="240887" cy="330732"/>
+            </a:xfrm>
+            <a:prstGeom prst="line">
+              <a:avLst/>
+            </a:prstGeom>
+            <a:ln>
+              <a:solidFill>
+                <a:srgbClr val="FF0000"/>
+              </a:solidFill>
+            </a:ln>
+          </p:spPr>
+          <p:style>
+            <a:lnRef idx="3">
+              <a:schemeClr val="accent2"/>
+            </a:lnRef>
+            <a:fillRef idx="0">
+              <a:schemeClr val="accent2"/>
+            </a:fillRef>
+            <a:effectRef idx="2">
+              <a:schemeClr val="accent2"/>
+            </a:effectRef>
+            <a:fontRef idx="minor">
+              <a:schemeClr val="tx1"/>
+            </a:fontRef>
+          </p:style>
+        </p:cxnSp>
+        <p:cxnSp>
+          <p:nvCxnSpPr>
+            <p:cNvPr id="29" name="Straight Connector 28">
+              <a:extLst>
+                <a:ext uri="{FF2B5EF4-FFF2-40B4-BE49-F238E27FC236}">
+                  <a16:creationId xmlns:a16="http://schemas.microsoft.com/office/drawing/2014/main" id="{3B6B6A8C-D60C-6768-ACFC-94A8AAA37F93}"/>
+                </a:ext>
+              </a:extLst>
+            </p:cNvPr>
+            <p:cNvCxnSpPr>
+              <a:stCxn id="23" idx="5"/>
+              <a:endCxn id="24" idx="1"/>
+            </p:cNvCxnSpPr>
+            <p:nvPr/>
+          </p:nvCxnSpPr>
+          <p:spPr>
+            <a:xfrm flipV="1">
+              <a:off x="9445745" y="4090864"/>
+              <a:ext cx="780050" cy="237768"/>
+            </a:xfrm>
+            <a:prstGeom prst="line">
+              <a:avLst/>
+            </a:prstGeom>
+            <a:ln>
+              <a:solidFill>
+                <a:srgbClr val="FF0000"/>
+              </a:solidFill>
+            </a:ln>
+          </p:spPr>
+          <p:style>
+            <a:lnRef idx="3">
+              <a:schemeClr val="accent2"/>
+            </a:lnRef>
+            <a:fillRef idx="0">
+              <a:schemeClr val="accent2"/>
+            </a:fillRef>
+            <a:effectRef idx="2">
+              <a:schemeClr val="accent2"/>
+            </a:effectRef>
+            <a:fontRef idx="minor">
+              <a:schemeClr val="tx1"/>
+            </a:fontRef>
+          </p:style>
+        </p:cxnSp>
+        <p:cxnSp>
+          <p:nvCxnSpPr>
+            <p:cNvPr id="30" name="Straight Connector 29">
+              <a:extLst>
+                <a:ext uri="{FF2B5EF4-FFF2-40B4-BE49-F238E27FC236}">
+                  <a16:creationId xmlns:a16="http://schemas.microsoft.com/office/drawing/2014/main" id="{38B05B90-043A-C492-F8CC-C42DA508BE83}"/>
+                </a:ext>
+              </a:extLst>
+            </p:cNvPr>
+            <p:cNvCxnSpPr>
+              <a:cxnSpLocks/>
+              <a:stCxn id="24" idx="6"/>
+              <a:endCxn id="25" idx="1"/>
+            </p:cNvCxnSpPr>
+            <p:nvPr/>
+          </p:nvCxnSpPr>
+          <p:spPr>
+            <a:xfrm flipV="1">
+              <a:off x="10373670" y="3712801"/>
+              <a:ext cx="743608" cy="311706"/>
+            </a:xfrm>
+            <a:prstGeom prst="line">
+              <a:avLst/>
+            </a:prstGeom>
+            <a:ln>
+              <a:solidFill>
+                <a:srgbClr val="FF0000"/>
+              </a:solidFill>
+            </a:ln>
+          </p:spPr>
+          <p:style>
+            <a:lnRef idx="3">
+              <a:schemeClr val="accent2"/>
+            </a:lnRef>
+            <a:fillRef idx="0">
+              <a:schemeClr val="accent2"/>
+            </a:fillRef>
+            <a:effectRef idx="2">
+              <a:schemeClr val="accent2"/>
+            </a:effectRef>
+            <a:fontRef idx="minor">
+              <a:schemeClr val="tx1"/>
+            </a:fontRef>
+          </p:style>
+        </p:cxnSp>
+        <p:cxnSp>
+          <p:nvCxnSpPr>
+            <p:cNvPr id="31" name="Straight Connector 30">
+              <a:extLst>
+                <a:ext uri="{FF2B5EF4-FFF2-40B4-BE49-F238E27FC236}">
+                  <a16:creationId xmlns:a16="http://schemas.microsoft.com/office/drawing/2014/main" id="{D82CBC59-3ED7-7670-6EBA-2208F61C9C93}"/>
+                </a:ext>
+              </a:extLst>
+            </p:cNvPr>
+            <p:cNvCxnSpPr>
+              <a:cxnSpLocks/>
+              <a:stCxn id="25" idx="6"/>
+            </p:cNvCxnSpPr>
+            <p:nvPr/>
+          </p:nvCxnSpPr>
+          <p:spPr>
+            <a:xfrm>
+              <a:off x="11265153" y="3646444"/>
+              <a:ext cx="501960" cy="338104"/>
+            </a:xfrm>
+            <a:prstGeom prst="line">
+              <a:avLst/>
+            </a:prstGeom>
+            <a:ln>
+              <a:solidFill>
+                <a:srgbClr val="FF0000"/>
+              </a:solidFill>
+            </a:ln>
+          </p:spPr>
+          <p:style>
+            <a:lnRef idx="3">
+              <a:schemeClr val="accent2"/>
+            </a:lnRef>
+            <a:fillRef idx="0">
+              <a:schemeClr val="accent2"/>
+            </a:fillRef>
+            <a:effectRef idx="2">
+              <a:schemeClr val="accent2"/>
+            </a:effectRef>
+            <a:fontRef idx="minor">
+              <a:schemeClr val="tx1"/>
+            </a:fontRef>
+          </p:style>
+        </p:cxnSp>
+        <p:sp>
+          <p:nvSpPr>
+            <p:cNvPr id="49" name="TextBox 48">
+              <a:extLst>
+                <a:ext uri="{FF2B5EF4-FFF2-40B4-BE49-F238E27FC236}">
+                  <a16:creationId xmlns:a16="http://schemas.microsoft.com/office/drawing/2014/main" id="{A23EFC8B-1F3C-4F4C-60B7-817C57A5C35E}"/>
+                </a:ext>
+              </a:extLst>
+            </p:cNvPr>
+            <p:cNvSpPr txBox="1"/>
+            <p:nvPr/>
+          </p:nvSpPr>
+          <p:spPr>
+            <a:xfrm>
+              <a:off x="10019857" y="4829312"/>
+              <a:ext cx="1158673" cy="338554"/>
+            </a:xfrm>
+            <a:prstGeom prst="rect">
+              <a:avLst/>
+            </a:prstGeom>
+            <a:noFill/>
+          </p:spPr>
+          <p:txBody>
+            <a:bodyPr wrap="square" rtlCol="0">
+              <a:spAutoFit/>
+            </a:bodyPr>
+            <a:lstStyle/>
+            <a:p>
+              <a:r>
+                <a:rPr lang="es-419" sz="1600" dirty="0"/>
+                <a:t>Semanas</a:t>
+              </a:r>
+            </a:p>
+          </p:txBody>
+        </p:sp>
+        <p:sp>
+          <p:nvSpPr>
+            <p:cNvPr id="51" name="TextBox 50">
+              <a:extLst>
+                <a:ext uri="{FF2B5EF4-FFF2-40B4-BE49-F238E27FC236}">
+                  <a16:creationId xmlns:a16="http://schemas.microsoft.com/office/drawing/2014/main" id="{365ABF94-C447-0B07-677A-F0B3ECED66D0}"/>
+                </a:ext>
+              </a:extLst>
+            </p:cNvPr>
+            <p:cNvSpPr txBox="1"/>
+            <p:nvPr/>
+          </p:nvSpPr>
+          <p:spPr>
+            <a:xfrm rot="5400000">
+              <a:off x="8127806" y="4014776"/>
+              <a:ext cx="1515146" cy="338554"/>
+            </a:xfrm>
+            <a:prstGeom prst="rect">
+              <a:avLst/>
+            </a:prstGeom>
+            <a:noFill/>
+          </p:spPr>
+          <p:txBody>
+            <a:bodyPr wrap="square" rtlCol="0">
+              <a:spAutoFit/>
+            </a:bodyPr>
+            <a:lstStyle/>
+            <a:p>
+              <a:r>
+                <a:rPr lang="es-419" sz="1600" dirty="0"/>
+                <a:t>Mantenibilidad</a:t>
+              </a:r>
+            </a:p>
+          </p:txBody>
+        </p:sp>
+      </p:grpSp>
+      <p:pic>
+        <p:nvPicPr>
+          <p:cNvPr id="55" name="Picture 54">
+            <a:extLst>
+              <a:ext uri="{FF2B5EF4-FFF2-40B4-BE49-F238E27FC236}">
+                <a16:creationId xmlns:a16="http://schemas.microsoft.com/office/drawing/2014/main" id="{F61B7145-D8F9-364A-2559-B844954B3B9A}"/>
+              </a:ext>
+            </a:extLst>
+          </p:cNvPr>
+          <p:cNvPicPr>
+            <a:picLocks noChangeAspect="1"/>
+          </p:cNvPicPr>
+          <p:nvPr/>
+        </p:nvPicPr>
+        <p:blipFill>
+          <a:blip r:embed="rId2"/>
+          <a:stretch>
+            <a:fillRect/>
+          </a:stretch>
+        </p:blipFill>
+        <p:spPr>
+          <a:xfrm>
+            <a:off x="8801898" y="5350203"/>
+            <a:ext cx="1063819" cy="1386243"/>
+          </a:xfrm>
+          <a:prstGeom prst="rect">
+            <a:avLst/>
+          </a:prstGeom>
+        </p:spPr>
+      </p:pic>
+    </p:spTree>
+    <p:extLst>
+      <p:ext uri="{BB962C8B-B14F-4D97-AF65-F5344CB8AC3E}">
+        <p14:creationId xmlns:p14="http://schemas.microsoft.com/office/powerpoint/2010/main" val="3803891583"/>
+      </p:ext>
+    </p:extLst>
+  </p:cSld>
+  <p:clrMapOvr>
+    <a:masterClrMapping/>
+  </p:clrMapOvr>
+</p:sld>
+</file>
+
+<file path=ppt/slides/slide9.xml><?xml version="1.0" encoding="utf-8"?>
+<p:sld xmlns:a="http://schemas.openxmlformats.org/drawingml/2006/main" xmlns:r="http://schemas.openxmlformats.org/officeDocument/2006/relationships" xmlns:p="http://schemas.openxmlformats.org/presentationml/2006/main">
+  <p:cSld>
+    <p:spTree>
+      <p:nvGrpSpPr>
+        <p:cNvPr id="1" name=""/>
+        <p:cNvGrpSpPr/>
+        <p:nvPr/>
+      </p:nvGrpSpPr>
+      <p:grpSpPr>
+        <a:xfrm>
+          <a:off x="0" y="0"/>
+          <a:ext cx="0" cy="0"/>
+          <a:chOff x="0" y="0"/>
+          <a:chExt cx="0" cy="0"/>
+        </a:xfrm>
+      </p:grpSpPr>
+      <p:sp>
+        <p:nvSpPr>
+          <p:cNvPr id="24" name="Rectangle 23">
+            <a:extLst>
+              <a:ext uri="{FF2B5EF4-FFF2-40B4-BE49-F238E27FC236}">
+                <a16:creationId xmlns:a16="http://schemas.microsoft.com/office/drawing/2014/main" id="{4564849E-29F4-7628-CF6D-605C7A13122D}"/>
+              </a:ext>
+            </a:extLst>
+          </p:cNvPr>
+          <p:cNvSpPr/>
+          <p:nvPr/>
+        </p:nvSpPr>
+        <p:spPr>
+          <a:xfrm>
+            <a:off x="140466" y="464461"/>
+            <a:ext cx="8001815" cy="4976160"/>
+          </a:xfrm>
+          <a:prstGeom prst="rect">
+            <a:avLst/>
+          </a:prstGeom>
+        </p:spPr>
+        <p:style>
+          <a:lnRef idx="2">
+            <a:schemeClr val="accent3">
+              <a:shade val="50000"/>
+            </a:schemeClr>
+          </a:lnRef>
+          <a:fillRef idx="1">
+            <a:schemeClr val="accent3"/>
+          </a:fillRef>
+          <a:effectRef idx="0">
+            <a:schemeClr val="accent3"/>
+          </a:effectRef>
+          <a:fontRef idx="minor">
+            <a:schemeClr val="lt1"/>
+          </a:fontRef>
+        </p:style>
+        <p:txBody>
+          <a:bodyPr rtlCol="0" anchor="ctr"/>
+          <a:lstStyle/>
+          <a:p>
+            <a:pPr algn="ctr"/>
+            <a:endParaRPr lang="es-419"/>
+          </a:p>
+        </p:txBody>
+      </p:sp>
+      <p:grpSp>
+        <p:nvGrpSpPr>
+          <p:cNvPr id="28" name="Group 27">
+            <a:extLst>
+              <a:ext uri="{FF2B5EF4-FFF2-40B4-BE49-F238E27FC236}">
+                <a16:creationId xmlns:a16="http://schemas.microsoft.com/office/drawing/2014/main" id="{128A5813-FB54-2C30-1858-E60E38C27E42}"/>
+              </a:ext>
+            </a:extLst>
+          </p:cNvPr>
+          <p:cNvGrpSpPr/>
+          <p:nvPr/>
+        </p:nvGrpSpPr>
+        <p:grpSpPr>
+          <a:xfrm>
+            <a:off x="2983922" y="1120412"/>
+            <a:ext cx="3771488" cy="4115906"/>
+            <a:chOff x="2964872" y="1202962"/>
+            <a:chExt cx="3771488" cy="4115906"/>
+          </a:xfrm>
+        </p:grpSpPr>
+        <p:sp>
+          <p:nvSpPr>
+            <p:cNvPr id="26" name="Rectangle 25">
+              <a:extLst>
+                <a:ext uri="{FF2B5EF4-FFF2-40B4-BE49-F238E27FC236}">
+                  <a16:creationId xmlns:a16="http://schemas.microsoft.com/office/drawing/2014/main" id="{C022ED82-CA7C-3599-D60F-245EF636BBD4}"/>
+                </a:ext>
+              </a:extLst>
+            </p:cNvPr>
+            <p:cNvSpPr/>
+            <p:nvPr/>
+          </p:nvSpPr>
+          <p:spPr>
+            <a:xfrm>
+              <a:off x="3848817" y="3722399"/>
+              <a:ext cx="2675178" cy="217531"/>
+            </a:xfrm>
+            <a:prstGeom prst="rect">
+              <a:avLst/>
+            </a:prstGeom>
+            <a:solidFill>
+              <a:schemeClr val="accent2">
+                <a:lumMod val="60000"/>
+                <a:lumOff val="40000"/>
+              </a:schemeClr>
+            </a:solidFill>
+            <a:ln>
+              <a:noFill/>
+            </a:ln>
+          </p:spPr>
+          <p:style>
+            <a:lnRef idx="2">
+              <a:schemeClr val="accent4">
+                <a:shade val="50000"/>
+              </a:schemeClr>
+            </a:lnRef>
+            <a:fillRef idx="1">
+              <a:schemeClr val="accent4"/>
+            </a:fillRef>
+            <a:effectRef idx="0">
+              <a:schemeClr val="accent4"/>
+            </a:effectRef>
+            <a:fontRef idx="minor">
+              <a:schemeClr val="lt1"/>
+            </a:fontRef>
+          </p:style>
+          <p:txBody>
+            <a:bodyPr rtlCol="0" anchor="ctr"/>
+            <a:lstStyle/>
+            <a:p>
+              <a:pPr algn="ctr"/>
+              <a:endParaRPr lang="es-419"/>
+            </a:p>
+          </p:txBody>
+        </p:sp>
+        <p:sp>
+          <p:nvSpPr>
+            <p:cNvPr id="25" name="Rectangle 24">
+              <a:extLst>
+                <a:ext uri="{FF2B5EF4-FFF2-40B4-BE49-F238E27FC236}">
+                  <a16:creationId xmlns:a16="http://schemas.microsoft.com/office/drawing/2014/main" id="{205256D2-48CB-338F-7BC6-C98835DBF019}"/>
+                </a:ext>
+              </a:extLst>
+            </p:cNvPr>
+            <p:cNvSpPr/>
+            <p:nvPr/>
+          </p:nvSpPr>
+          <p:spPr>
+            <a:xfrm>
+              <a:off x="3839235" y="4352154"/>
+              <a:ext cx="2684759" cy="646946"/>
+            </a:xfrm>
+            <a:prstGeom prst="rect">
+              <a:avLst/>
+            </a:prstGeom>
+            <a:solidFill>
+              <a:srgbClr val="92D050"/>
+            </a:solidFill>
+            <a:ln>
+              <a:noFill/>
+            </a:ln>
+          </p:spPr>
+          <p:style>
+            <a:lnRef idx="2">
+              <a:schemeClr val="accent4">
+                <a:shade val="50000"/>
+              </a:schemeClr>
+            </a:lnRef>
+            <a:fillRef idx="1">
+              <a:schemeClr val="accent4"/>
+            </a:fillRef>
+            <a:effectRef idx="0">
+              <a:schemeClr val="accent4"/>
+            </a:effectRef>
+            <a:fontRef idx="minor">
+              <a:schemeClr val="lt1"/>
+            </a:fontRef>
+          </p:style>
+          <p:txBody>
+            <a:bodyPr rtlCol="0" anchor="ctr"/>
+            <a:lstStyle/>
+            <a:p>
+              <a:pPr algn="ctr"/>
+              <a:endParaRPr lang="es-419"/>
+            </a:p>
+          </p:txBody>
+        </p:sp>
+        <p:grpSp>
+          <p:nvGrpSpPr>
+            <p:cNvPr id="2" name="Group 1">
+              <a:extLst>
+                <a:ext uri="{FF2B5EF4-FFF2-40B4-BE49-F238E27FC236}">
+                  <a16:creationId xmlns:a16="http://schemas.microsoft.com/office/drawing/2014/main" id="{BF325B1B-7E8B-02D8-3A51-F6987F77D33A}"/>
+                </a:ext>
+              </a:extLst>
+            </p:cNvPr>
+            <p:cNvGrpSpPr/>
+            <p:nvPr/>
+          </p:nvGrpSpPr>
+          <p:grpSpPr>
+            <a:xfrm>
+              <a:off x="2964872" y="1202962"/>
+              <a:ext cx="3771488" cy="4115906"/>
+              <a:chOff x="8207991" y="1051960"/>
+              <a:chExt cx="3771488" cy="4115906"/>
+            </a:xfrm>
+          </p:grpSpPr>
+          <p:sp>
+            <p:nvSpPr>
+              <p:cNvPr id="3" name="Rectangle 2">
+                <a:extLst>
+                  <a:ext uri="{FF2B5EF4-FFF2-40B4-BE49-F238E27FC236}">
+                    <a16:creationId xmlns:a16="http://schemas.microsoft.com/office/drawing/2014/main" id="{5CE8F39D-115A-1522-06E4-07E98BF608D6}"/>
+                  </a:ext>
+                </a:extLst>
+              </p:cNvPr>
+              <p:cNvSpPr/>
+              <p:nvPr/>
+            </p:nvSpPr>
+            <p:spPr>
+              <a:xfrm>
+                <a:off x="9082354" y="3788664"/>
+                <a:ext cx="2684759" cy="412450"/>
+              </a:xfrm>
+              <a:prstGeom prst="rect">
+                <a:avLst/>
+              </a:prstGeom>
+              <a:solidFill>
+                <a:schemeClr val="accent4">
+                  <a:lumMod val="60000"/>
+                  <a:lumOff val="40000"/>
+                </a:schemeClr>
+              </a:solidFill>
+              <a:ln>
+                <a:noFill/>
+              </a:ln>
+            </p:spPr>
+            <p:style>
+              <a:lnRef idx="2">
+                <a:schemeClr val="accent4">
+                  <a:shade val="50000"/>
+                </a:schemeClr>
+              </a:lnRef>
+              <a:fillRef idx="1">
+                <a:schemeClr val="accent4"/>
+              </a:fillRef>
+              <a:effectRef idx="0">
+                <a:schemeClr val="accent4"/>
+              </a:effectRef>
+              <a:fontRef idx="minor">
+                <a:schemeClr val="lt1"/>
+              </a:fontRef>
+            </p:style>
+            <p:txBody>
+              <a:bodyPr rtlCol="0" anchor="ctr"/>
+              <a:lstStyle/>
+              <a:p>
+                <a:pPr algn="ctr"/>
+                <a:endParaRPr lang="es-419"/>
+              </a:p>
+            </p:txBody>
+          </p:sp>
+          <p:cxnSp>
+            <p:nvCxnSpPr>
+              <p:cNvPr id="4" name="Straight Arrow Connector 3">
+                <a:extLst>
+                  <a:ext uri="{FF2B5EF4-FFF2-40B4-BE49-F238E27FC236}">
+                    <a16:creationId xmlns:a16="http://schemas.microsoft.com/office/drawing/2014/main" id="{6BB2BECE-3645-9A51-0F2B-D89984D8BAA5}"/>
+                  </a:ext>
+                </a:extLst>
+              </p:cNvPr>
+              <p:cNvCxnSpPr>
+                <a:cxnSpLocks/>
+              </p:cNvCxnSpPr>
+              <p:nvPr/>
+            </p:nvCxnSpPr>
+            <p:spPr>
+              <a:xfrm flipV="1">
+                <a:off x="9082354" y="1051960"/>
+                <a:ext cx="0" cy="1866116"/>
+              </a:xfrm>
+              <a:prstGeom prst="straightConnector1">
+                <a:avLst/>
+              </a:prstGeom>
+              <a:ln w="38100">
+                <a:solidFill>
+                  <a:schemeClr val="bg1">
+                    <a:lumMod val="95000"/>
+                  </a:schemeClr>
+                </a:solidFill>
+                <a:tailEnd type="triangle"/>
+              </a:ln>
+            </p:spPr>
+            <p:style>
+              <a:lnRef idx="3">
+                <a:schemeClr val="dk1"/>
+              </a:lnRef>
+              <a:fillRef idx="0">
+                <a:schemeClr val="dk1"/>
+              </a:fillRef>
+              <a:effectRef idx="2">
+                <a:schemeClr val="dk1"/>
+              </a:effectRef>
+              <a:fontRef idx="minor">
+                <a:schemeClr val="tx1"/>
+              </a:fontRef>
+            </p:style>
+          </p:cxnSp>
+          <p:cxnSp>
+            <p:nvCxnSpPr>
+              <p:cNvPr id="5" name="Straight Arrow Connector 4">
+                <a:extLst>
+                  <a:ext uri="{FF2B5EF4-FFF2-40B4-BE49-F238E27FC236}">
+                    <a16:creationId xmlns:a16="http://schemas.microsoft.com/office/drawing/2014/main" id="{5C91BB28-6C10-6B9E-F64C-BC2801C2CB5B}"/>
+                  </a:ext>
+                </a:extLst>
+              </p:cNvPr>
+              <p:cNvCxnSpPr>
+                <a:cxnSpLocks/>
+              </p:cNvCxnSpPr>
+              <p:nvPr/>
+            </p:nvCxnSpPr>
+            <p:spPr>
+              <a:xfrm>
+                <a:off x="8949198" y="2775855"/>
+                <a:ext cx="2817915" cy="0"/>
+              </a:xfrm>
+              <a:prstGeom prst="straightConnector1">
+                <a:avLst/>
+              </a:prstGeom>
+              <a:ln w="38100">
+                <a:solidFill>
+                  <a:schemeClr val="bg1">
+                    <a:lumMod val="95000"/>
+                  </a:schemeClr>
+                </a:solidFill>
+                <a:tailEnd type="triangle"/>
+              </a:ln>
+            </p:spPr>
+            <p:style>
+              <a:lnRef idx="3">
+                <a:schemeClr val="dk1"/>
+              </a:lnRef>
+              <a:fillRef idx="0">
+                <a:schemeClr val="dk1"/>
+              </a:fillRef>
+              <a:effectRef idx="2">
+                <a:schemeClr val="dk1"/>
+              </a:effectRef>
+              <a:fontRef idx="minor">
+                <a:schemeClr val="tx1"/>
+              </a:fontRef>
+            </p:style>
+          </p:cxnSp>
+          <p:sp>
+            <p:nvSpPr>
+              <p:cNvPr id="6" name="Oval 5">
+                <a:extLst>
+                  <a:ext uri="{FF2B5EF4-FFF2-40B4-BE49-F238E27FC236}">
+                    <a16:creationId xmlns:a16="http://schemas.microsoft.com/office/drawing/2014/main" id="{C5D06DDE-EE31-0941-2398-72859A157CC6}"/>
+                  </a:ext>
+                </a:extLst>
+              </p:cNvPr>
+              <p:cNvSpPr/>
+              <p:nvPr/>
+            </p:nvSpPr>
+            <p:spPr>
+              <a:xfrm>
+                <a:off x="9896162" y="1414706"/>
+                <a:ext cx="592924" cy="570312"/>
+              </a:xfrm>
+              <a:prstGeom prst="ellipse">
+                <a:avLst/>
+              </a:prstGeom>
+              <a:gradFill flip="none" rotWithShape="1">
+                <a:gsLst>
+                  <a:gs pos="0">
+                    <a:schemeClr val="accent5">
+                      <a:lumMod val="60000"/>
+                      <a:lumOff val="40000"/>
+                      <a:tint val="66000"/>
+                      <a:satMod val="160000"/>
+                    </a:schemeClr>
+                  </a:gs>
+                  <a:gs pos="50000">
+                    <a:schemeClr val="accent5">
+                      <a:lumMod val="60000"/>
+                      <a:lumOff val="40000"/>
+                      <a:tint val="44500"/>
+                      <a:satMod val="160000"/>
+                    </a:schemeClr>
+                  </a:gs>
+                  <a:gs pos="100000">
+                    <a:schemeClr val="accent5">
+                      <a:lumMod val="60000"/>
+                      <a:lumOff val="40000"/>
+                      <a:tint val="23500"/>
+                      <a:satMod val="160000"/>
+                    </a:schemeClr>
+                  </a:gs>
+                </a:gsLst>
+                <a:lin ang="2700000" scaled="1"/>
+                <a:tileRect/>
+              </a:gradFill>
+              <a:ln>
+                <a:noFill/>
+              </a:ln>
+            </p:spPr>
+            <p:style>
+              <a:lnRef idx="2">
+                <a:schemeClr val="accent4">
+                  <a:shade val="50000"/>
+                </a:schemeClr>
+              </a:lnRef>
+              <a:fillRef idx="1">
+                <a:schemeClr val="accent4"/>
+              </a:fillRef>
+              <a:effectRef idx="0">
+                <a:schemeClr val="accent4"/>
+              </a:effectRef>
+              <a:fontRef idx="minor">
+                <a:schemeClr val="lt1"/>
+              </a:fontRef>
+            </p:style>
+            <p:txBody>
+              <a:bodyPr rtlCol="0" anchor="ctr"/>
+              <a:lstStyle/>
+              <a:p>
+                <a:pPr algn="ctr"/>
+                <a:endParaRPr lang="es-419"/>
+              </a:p>
+            </p:txBody>
+          </p:sp>
+          <p:sp>
+            <p:nvSpPr>
+              <p:cNvPr id="7" name="Oval 6">
+                <a:extLst>
+                  <a:ext uri="{FF2B5EF4-FFF2-40B4-BE49-F238E27FC236}">
+                    <a16:creationId xmlns:a16="http://schemas.microsoft.com/office/drawing/2014/main" id="{6F627231-9D56-103D-513C-655D6F4B632B}"/>
+                  </a:ext>
+                </a:extLst>
+              </p:cNvPr>
+              <p:cNvSpPr/>
+              <p:nvPr/>
+            </p:nvSpPr>
+            <p:spPr>
+              <a:xfrm>
+                <a:off x="9361238" y="2257192"/>
+                <a:ext cx="256040" cy="246489"/>
+              </a:xfrm>
+              <a:prstGeom prst="ellipse">
+                <a:avLst/>
+              </a:prstGeom>
+              <a:gradFill flip="none" rotWithShape="1">
+                <a:gsLst>
+                  <a:gs pos="0">
+                    <a:schemeClr val="accent5">
+                      <a:lumMod val="60000"/>
+                      <a:lumOff val="40000"/>
+                      <a:tint val="66000"/>
+                      <a:satMod val="160000"/>
+                    </a:schemeClr>
+                  </a:gs>
+                  <a:gs pos="50000">
+                    <a:schemeClr val="accent5">
+                      <a:lumMod val="60000"/>
+                      <a:lumOff val="40000"/>
+                      <a:tint val="44500"/>
+                      <a:satMod val="160000"/>
+                    </a:schemeClr>
+                  </a:gs>
+                  <a:gs pos="100000">
+                    <a:schemeClr val="accent5">
+                      <a:lumMod val="60000"/>
+                      <a:lumOff val="40000"/>
+                      <a:tint val="23500"/>
+                      <a:satMod val="160000"/>
+                    </a:schemeClr>
+                  </a:gs>
+                </a:gsLst>
+                <a:lin ang="2700000" scaled="1"/>
+                <a:tileRect/>
+              </a:gradFill>
+              <a:ln>
+                <a:noFill/>
+              </a:ln>
+            </p:spPr>
+            <p:style>
+              <a:lnRef idx="2">
+                <a:schemeClr val="accent6">
+                  <a:shade val="50000"/>
+                </a:schemeClr>
+              </a:lnRef>
+              <a:fillRef idx="1">
+                <a:schemeClr val="accent6"/>
+              </a:fillRef>
+              <a:effectRef idx="0">
+                <a:schemeClr val="accent6"/>
+              </a:effectRef>
+              <a:fontRef idx="minor">
+                <a:schemeClr val="lt1"/>
+              </a:fontRef>
+            </p:style>
+            <p:txBody>
+              <a:bodyPr rtlCol="0" anchor="ctr"/>
+              <a:lstStyle/>
+              <a:p>
+                <a:pPr algn="ctr"/>
+                <a:endParaRPr lang="es-419" dirty="0"/>
+              </a:p>
+            </p:txBody>
+          </p:sp>
+          <p:sp>
+            <p:nvSpPr>
+              <p:cNvPr id="8" name="Oval 7">
+                <a:extLst>
+                  <a:ext uri="{FF2B5EF4-FFF2-40B4-BE49-F238E27FC236}">
+                    <a16:creationId xmlns:a16="http://schemas.microsoft.com/office/drawing/2014/main" id="{E706A356-0012-AFA9-2975-DA845947CD82}"/>
+                  </a:ext>
+                </a:extLst>
+              </p:cNvPr>
+              <p:cNvSpPr/>
+              <p:nvPr/>
+            </p:nvSpPr>
+            <p:spPr>
+              <a:xfrm>
+                <a:off x="10641968" y="2136337"/>
+                <a:ext cx="411498" cy="367344"/>
+              </a:xfrm>
+              <a:prstGeom prst="ellipse">
+                <a:avLst/>
+              </a:prstGeom>
+              <a:gradFill flip="none" rotWithShape="1">
+                <a:gsLst>
+                  <a:gs pos="0">
+                    <a:schemeClr val="accent5">
+                      <a:lumMod val="60000"/>
+                      <a:lumOff val="40000"/>
+                      <a:tint val="66000"/>
+                      <a:satMod val="160000"/>
+                    </a:schemeClr>
+                  </a:gs>
+                  <a:gs pos="50000">
+                    <a:schemeClr val="accent5">
+                      <a:lumMod val="60000"/>
+                      <a:lumOff val="40000"/>
+                      <a:tint val="44500"/>
+                      <a:satMod val="160000"/>
+                    </a:schemeClr>
+                  </a:gs>
+                  <a:gs pos="100000">
+                    <a:schemeClr val="accent5">
+                      <a:lumMod val="60000"/>
+                      <a:lumOff val="40000"/>
+                      <a:tint val="23500"/>
+                      <a:satMod val="160000"/>
+                    </a:schemeClr>
+                  </a:gs>
+                </a:gsLst>
+                <a:lin ang="2700000" scaled="1"/>
+                <a:tileRect/>
+              </a:gradFill>
+              <a:ln>
+                <a:noFill/>
+              </a:ln>
+            </p:spPr>
+            <p:style>
+              <a:lnRef idx="2">
+                <a:schemeClr val="accent2">
+                  <a:shade val="50000"/>
+                </a:schemeClr>
+              </a:lnRef>
+              <a:fillRef idx="1">
+                <a:schemeClr val="accent2"/>
+              </a:fillRef>
+              <a:effectRef idx="0">
+                <a:schemeClr val="accent2"/>
+              </a:effectRef>
+              <a:fontRef idx="minor">
+                <a:schemeClr val="lt1"/>
+              </a:fontRef>
+            </p:style>
+            <p:txBody>
+              <a:bodyPr rtlCol="0" anchor="ctr"/>
+              <a:lstStyle/>
+              <a:p>
+                <a:pPr algn="ctr"/>
+                <a:endParaRPr lang="es-419"/>
+              </a:p>
+            </p:txBody>
+          </p:sp>
+          <p:cxnSp>
+            <p:nvCxnSpPr>
+              <p:cNvPr id="9" name="Straight Arrow Connector 8">
+                <a:extLst>
+                  <a:ext uri="{FF2B5EF4-FFF2-40B4-BE49-F238E27FC236}">
+                    <a16:creationId xmlns:a16="http://schemas.microsoft.com/office/drawing/2014/main" id="{C7DB3650-7157-1F1E-34C3-EA5D6A03056D}"/>
+                  </a:ext>
+                </a:extLst>
+              </p:cNvPr>
+              <p:cNvCxnSpPr>
+                <a:cxnSpLocks/>
+              </p:cNvCxnSpPr>
+              <p:nvPr/>
+            </p:nvCxnSpPr>
+            <p:spPr>
+              <a:xfrm>
+                <a:off x="9915787" y="1723358"/>
+                <a:ext cx="555834" cy="0"/>
+              </a:xfrm>
+              <a:prstGeom prst="straightConnector1">
+                <a:avLst/>
+              </a:prstGeom>
+              <a:ln>
+                <a:solidFill>
+                  <a:srgbClr val="FF0000"/>
+                </a:solidFill>
+                <a:headEnd type="triangle"/>
+                <a:tailEnd type="triangle"/>
+              </a:ln>
+            </p:spPr>
+            <p:style>
+              <a:lnRef idx="3">
+                <a:schemeClr val="dk1"/>
+              </a:lnRef>
+              <a:fillRef idx="0">
+                <a:schemeClr val="dk1"/>
+              </a:fillRef>
+              <a:effectRef idx="2">
+                <a:schemeClr val="dk1"/>
+              </a:effectRef>
+              <a:fontRef idx="minor">
+                <a:schemeClr val="tx1"/>
+              </a:fontRef>
+            </p:style>
+          </p:cxnSp>
+          <p:sp>
+            <p:nvSpPr>
+              <p:cNvPr id="10" name="TextBox 9">
+                <a:extLst>
+                  <a:ext uri="{FF2B5EF4-FFF2-40B4-BE49-F238E27FC236}">
+                    <a16:creationId xmlns:a16="http://schemas.microsoft.com/office/drawing/2014/main" id="{F933D084-D82E-6DC0-59FA-082E2128E4E0}"/>
+                  </a:ext>
+                </a:extLst>
+              </p:cNvPr>
+              <p:cNvSpPr txBox="1"/>
+              <p:nvPr/>
+            </p:nvSpPr>
+            <p:spPr>
+              <a:xfrm>
+                <a:off x="9222282" y="2762171"/>
+                <a:ext cx="2108483" cy="338554"/>
+              </a:xfrm>
+              <a:prstGeom prst="rect">
+                <a:avLst/>
+              </a:prstGeom>
+              <a:noFill/>
+            </p:spPr>
+            <p:txBody>
+              <a:bodyPr wrap="square" rtlCol="0">
+                <a:spAutoFit/>
+              </a:bodyPr>
+              <a:lstStyle/>
+              <a:p>
+                <a:r>
+                  <a:rPr lang="es-419" sz="1600" dirty="0">
+                    <a:solidFill>
+                      <a:schemeClr val="bg1"/>
+                    </a:solidFill>
+                  </a:rPr>
+                  <a:t>Tiempo de desarrollo</a:t>
+                </a:r>
+              </a:p>
+            </p:txBody>
+          </p:sp>
+          <p:sp>
+            <p:nvSpPr>
+              <p:cNvPr id="11" name="TextBox 10">
+                <a:extLst>
+                  <a:ext uri="{FF2B5EF4-FFF2-40B4-BE49-F238E27FC236}">
+                    <a16:creationId xmlns:a16="http://schemas.microsoft.com/office/drawing/2014/main" id="{3630A5C4-8373-CD9F-A46A-89BAE9AF0786}"/>
+                  </a:ext>
+                </a:extLst>
+              </p:cNvPr>
+              <p:cNvSpPr txBox="1"/>
+              <p:nvPr/>
+            </p:nvSpPr>
+            <p:spPr>
+              <a:xfrm rot="5400000">
+                <a:off x="8174729" y="1854546"/>
+                <a:ext cx="1476696" cy="338554"/>
+              </a:xfrm>
+              <a:prstGeom prst="rect">
+                <a:avLst/>
+              </a:prstGeom>
+              <a:noFill/>
+            </p:spPr>
+            <p:txBody>
+              <a:bodyPr wrap="square" rtlCol="0">
+                <a:spAutoFit/>
+              </a:bodyPr>
+              <a:lstStyle/>
+              <a:p>
+                <a:r>
+                  <a:rPr lang="es-419" sz="1600" dirty="0">
+                    <a:solidFill>
+                      <a:schemeClr val="bg1"/>
+                    </a:solidFill>
+                  </a:rPr>
+                  <a:t>Modularidad</a:t>
+                </a:r>
+              </a:p>
+            </p:txBody>
+          </p:sp>
+          <p:sp>
+            <p:nvSpPr>
+              <p:cNvPr id="12" name="TextBox 11">
+                <a:extLst>
+                  <a:ext uri="{FF2B5EF4-FFF2-40B4-BE49-F238E27FC236}">
+                    <a16:creationId xmlns:a16="http://schemas.microsoft.com/office/drawing/2014/main" id="{E625D7AB-3F41-4943-4C96-593E901F1128}"/>
+                  </a:ext>
+                </a:extLst>
+              </p:cNvPr>
+              <p:cNvSpPr txBox="1"/>
+              <p:nvPr/>
+            </p:nvSpPr>
+            <p:spPr>
+              <a:xfrm>
+                <a:off x="10541189" y="1395286"/>
+                <a:ext cx="1438290" cy="584775"/>
+              </a:xfrm>
+              <a:prstGeom prst="rect">
+                <a:avLst/>
+              </a:prstGeom>
+              <a:noFill/>
+            </p:spPr>
+            <p:txBody>
+              <a:bodyPr wrap="square" rtlCol="0">
+                <a:spAutoFit/>
+              </a:bodyPr>
+              <a:lstStyle/>
+              <a:p>
+                <a:r>
+                  <a:rPr lang="es-419" sz="1600" dirty="0">
+                    <a:solidFill>
+                      <a:schemeClr val="bg1"/>
+                    </a:solidFill>
+                  </a:rPr>
+                  <a:t>Diámetro: </a:t>
+                </a:r>
+                <a:r>
+                  <a:rPr lang="es-419" sz="1600" dirty="0" err="1">
+                    <a:solidFill>
+                      <a:schemeClr val="bg1"/>
+                    </a:solidFill>
+                  </a:rPr>
+                  <a:t>LoC</a:t>
+                </a:r>
+                <a:r>
+                  <a:rPr lang="es-419" sz="1600" dirty="0">
+                    <a:solidFill>
+                      <a:schemeClr val="bg1"/>
+                    </a:solidFill>
+                  </a:rPr>
+                  <a:t> (</a:t>
+                </a:r>
+                <a:r>
+                  <a:rPr lang="es-419" sz="1600" dirty="0" err="1">
+                    <a:solidFill>
+                      <a:schemeClr val="bg1"/>
+                    </a:solidFill>
+                  </a:rPr>
+                  <a:t>Lines</a:t>
+                </a:r>
+                <a:r>
+                  <a:rPr lang="es-419" sz="1600" dirty="0">
+                    <a:solidFill>
+                      <a:schemeClr val="bg1"/>
+                    </a:solidFill>
+                  </a:rPr>
+                  <a:t> </a:t>
+                </a:r>
+                <a:r>
+                  <a:rPr lang="es-419" sz="1600" dirty="0" err="1">
+                    <a:solidFill>
+                      <a:schemeClr val="bg1"/>
+                    </a:solidFill>
+                  </a:rPr>
+                  <a:t>of</a:t>
+                </a:r>
+                <a:r>
+                  <a:rPr lang="es-419" sz="1600" dirty="0">
+                    <a:solidFill>
+                      <a:schemeClr val="bg1"/>
+                    </a:solidFill>
+                  </a:rPr>
+                  <a:t> </a:t>
+                </a:r>
+                <a:r>
+                  <a:rPr lang="es-419" sz="1600" dirty="0" err="1">
+                    <a:solidFill>
+                      <a:schemeClr val="bg1"/>
+                    </a:solidFill>
+                  </a:rPr>
+                  <a:t>Code</a:t>
+                </a:r>
+                <a:r>
+                  <a:rPr lang="es-419" sz="1600" dirty="0">
+                    <a:solidFill>
+                      <a:schemeClr val="bg1"/>
+                    </a:solidFill>
+                  </a:rPr>
+                  <a:t>)</a:t>
+                </a:r>
+              </a:p>
+            </p:txBody>
+          </p:sp>
+          <p:cxnSp>
+            <p:nvCxnSpPr>
+              <p:cNvPr id="14" name="Straight Connector 13">
+                <a:extLst>
+                  <a:ext uri="{FF2B5EF4-FFF2-40B4-BE49-F238E27FC236}">
+                    <a16:creationId xmlns:a16="http://schemas.microsoft.com/office/drawing/2014/main" id="{B18E05BD-DF72-A6C3-361F-0F6C3E1EDC85}"/>
+                  </a:ext>
+                </a:extLst>
+              </p:cNvPr>
+              <p:cNvCxnSpPr>
+                <a:cxnSpLocks/>
+              </p:cNvCxnSpPr>
+              <p:nvPr/>
+            </p:nvCxnSpPr>
+            <p:spPr>
+              <a:xfrm>
+                <a:off x="8893914" y="4856283"/>
+                <a:ext cx="2929311" cy="0"/>
+              </a:xfrm>
+              <a:prstGeom prst="line">
+                <a:avLst/>
+              </a:prstGeom>
+              <a:ln w="38100">
+                <a:solidFill>
+                  <a:schemeClr val="bg1"/>
+                </a:solidFill>
+                <a:headEnd type="none" w="med" len="med"/>
+                <a:tailEnd type="none" w="med" len="med"/>
+              </a:ln>
+            </p:spPr>
+            <p:style>
+              <a:lnRef idx="3">
+                <a:schemeClr val="accent6"/>
+              </a:lnRef>
+              <a:fillRef idx="0">
+                <a:schemeClr val="accent6"/>
+              </a:fillRef>
+              <a:effectRef idx="2">
+                <a:schemeClr val="accent6"/>
+              </a:effectRef>
+              <a:fontRef idx="minor">
+                <a:schemeClr val="tx1"/>
+              </a:fontRef>
+            </p:style>
+          </p:cxnSp>
+          <p:sp>
+            <p:nvSpPr>
+              <p:cNvPr id="15" name="Oval 14">
+                <a:extLst>
+                  <a:ext uri="{FF2B5EF4-FFF2-40B4-BE49-F238E27FC236}">
+                    <a16:creationId xmlns:a16="http://schemas.microsoft.com/office/drawing/2014/main" id="{0C11BAE9-BEB5-7517-1AC3-99CFCCD02DC0}"/>
+                  </a:ext>
+                </a:extLst>
+              </p:cNvPr>
+              <p:cNvSpPr/>
+              <p:nvPr/>
+            </p:nvSpPr>
+            <p:spPr>
+              <a:xfrm flipV="1">
+                <a:off x="9297870" y="4301146"/>
+                <a:ext cx="173246" cy="187686"/>
+              </a:xfrm>
+              <a:prstGeom prst="ellipse">
+                <a:avLst/>
+              </a:prstGeom>
+              <a:solidFill>
+                <a:srgbClr val="FF0000"/>
+              </a:solidFill>
+              <a:ln>
+                <a:solidFill>
+                  <a:srgbClr val="FF0000"/>
+                </a:solidFill>
+              </a:ln>
+            </p:spPr>
+            <p:style>
+              <a:lnRef idx="2">
+                <a:schemeClr val="accent2">
+                  <a:shade val="50000"/>
+                </a:schemeClr>
+              </a:lnRef>
+              <a:fillRef idx="1">
+                <a:schemeClr val="accent2"/>
+              </a:fillRef>
+              <a:effectRef idx="0">
+                <a:schemeClr val="accent2"/>
+              </a:effectRef>
+              <a:fontRef idx="minor">
+                <a:schemeClr val="lt1"/>
+              </a:fontRef>
+            </p:style>
+            <p:txBody>
+              <a:bodyPr rtlCol="0" anchor="ctr"/>
+              <a:lstStyle/>
+              <a:p>
+                <a:pPr algn="ctr"/>
+                <a:endParaRPr lang="es-419"/>
+              </a:p>
+            </p:txBody>
+          </p:sp>
+          <p:sp>
+            <p:nvSpPr>
+              <p:cNvPr id="16" name="Oval 15">
+                <a:extLst>
+                  <a:ext uri="{FF2B5EF4-FFF2-40B4-BE49-F238E27FC236}">
+                    <a16:creationId xmlns:a16="http://schemas.microsoft.com/office/drawing/2014/main" id="{B889FD6C-A9C9-34C8-9576-B47DB823545F}"/>
+                  </a:ext>
+                </a:extLst>
+              </p:cNvPr>
+              <p:cNvSpPr/>
+              <p:nvPr/>
+            </p:nvSpPr>
+            <p:spPr>
+              <a:xfrm flipV="1">
+                <a:off x="10200424" y="3930664"/>
+                <a:ext cx="173246" cy="187686"/>
+              </a:xfrm>
+              <a:prstGeom prst="ellipse">
+                <a:avLst/>
+              </a:prstGeom>
+              <a:solidFill>
+                <a:srgbClr val="FF0000"/>
+              </a:solidFill>
+              <a:ln>
+                <a:solidFill>
+                  <a:srgbClr val="FF0000"/>
+                </a:solidFill>
+              </a:ln>
+            </p:spPr>
+            <p:style>
+              <a:lnRef idx="2">
+                <a:schemeClr val="accent2">
+                  <a:shade val="50000"/>
+                </a:schemeClr>
+              </a:lnRef>
+              <a:fillRef idx="1">
+                <a:schemeClr val="accent2"/>
+              </a:fillRef>
+              <a:effectRef idx="0">
+                <a:schemeClr val="accent2"/>
+              </a:effectRef>
+              <a:fontRef idx="minor">
+                <a:schemeClr val="lt1"/>
+              </a:fontRef>
+            </p:style>
+            <p:txBody>
+              <a:bodyPr rtlCol="0" anchor="ctr"/>
+              <a:lstStyle/>
+              <a:p>
+                <a:pPr algn="ctr"/>
+                <a:endParaRPr lang="es-419"/>
+              </a:p>
+            </p:txBody>
+          </p:sp>
+          <p:sp>
+            <p:nvSpPr>
+              <p:cNvPr id="17" name="Oval 16">
+                <a:extLst>
+                  <a:ext uri="{FF2B5EF4-FFF2-40B4-BE49-F238E27FC236}">
+                    <a16:creationId xmlns:a16="http://schemas.microsoft.com/office/drawing/2014/main" id="{6D9BE92A-AEC5-DA38-0CBB-FBEA6FED5A18}"/>
+                  </a:ext>
+                </a:extLst>
+              </p:cNvPr>
+              <p:cNvSpPr/>
+              <p:nvPr/>
+            </p:nvSpPr>
+            <p:spPr>
+              <a:xfrm flipV="1">
+                <a:off x="11091907" y="3552601"/>
+                <a:ext cx="173246" cy="187686"/>
+              </a:xfrm>
+              <a:prstGeom prst="ellipse">
+                <a:avLst/>
+              </a:prstGeom>
+              <a:solidFill>
+                <a:srgbClr val="FF0000"/>
+              </a:solidFill>
+              <a:ln>
+                <a:solidFill>
+                  <a:srgbClr val="FF0000"/>
+                </a:solidFill>
+              </a:ln>
+            </p:spPr>
+            <p:style>
+              <a:lnRef idx="2">
+                <a:schemeClr val="accent2">
+                  <a:shade val="50000"/>
+                </a:schemeClr>
+              </a:lnRef>
+              <a:fillRef idx="1">
+                <a:schemeClr val="accent2"/>
+              </a:fillRef>
+              <a:effectRef idx="0">
+                <a:schemeClr val="accent2"/>
+              </a:effectRef>
+              <a:fontRef idx="minor">
+                <a:schemeClr val="lt1"/>
+              </a:fontRef>
+            </p:style>
+            <p:txBody>
+              <a:bodyPr rtlCol="0" anchor="ctr"/>
+              <a:lstStyle/>
+              <a:p>
+                <a:pPr algn="ctr"/>
+                <a:endParaRPr lang="es-419"/>
+              </a:p>
+            </p:txBody>
+          </p:sp>
+          <p:cxnSp>
+            <p:nvCxnSpPr>
+              <p:cNvPr id="18" name="Straight Connector 17">
+                <a:extLst>
+                  <a:ext uri="{FF2B5EF4-FFF2-40B4-BE49-F238E27FC236}">
+                    <a16:creationId xmlns:a16="http://schemas.microsoft.com/office/drawing/2014/main" id="{CA55383C-4113-CA43-96E6-B74C7CB8D61F}"/>
+                  </a:ext>
+                </a:extLst>
+              </p:cNvPr>
+              <p:cNvCxnSpPr>
+                <a:cxnSpLocks/>
+                <a:endCxn id="15" idx="1"/>
+              </p:cNvCxnSpPr>
+              <p:nvPr/>
+            </p:nvCxnSpPr>
+            <p:spPr>
+              <a:xfrm flipV="1">
+                <a:off x="9082354" y="4461346"/>
+                <a:ext cx="240887" cy="330732"/>
+              </a:xfrm>
+              <a:prstGeom prst="line">
+                <a:avLst/>
+              </a:prstGeom>
+              <a:ln w="38100">
+                <a:solidFill>
+                  <a:srgbClr val="FF0000"/>
+                </a:solidFill>
+              </a:ln>
+            </p:spPr>
+            <p:style>
+              <a:lnRef idx="3">
+                <a:schemeClr val="accent2"/>
+              </a:lnRef>
+              <a:fillRef idx="0">
+                <a:schemeClr val="accent2"/>
+              </a:fillRef>
+              <a:effectRef idx="2">
+                <a:schemeClr val="accent2"/>
+              </a:effectRef>
+              <a:fontRef idx="minor">
+                <a:schemeClr val="tx1"/>
+              </a:fontRef>
+            </p:style>
+          </p:cxnSp>
+          <p:cxnSp>
+            <p:nvCxnSpPr>
+              <p:cNvPr id="19" name="Straight Connector 18">
+                <a:extLst>
+                  <a:ext uri="{FF2B5EF4-FFF2-40B4-BE49-F238E27FC236}">
+                    <a16:creationId xmlns:a16="http://schemas.microsoft.com/office/drawing/2014/main" id="{435E57DD-4CFC-AB22-7ABB-907ECA9A0018}"/>
+                  </a:ext>
+                </a:extLst>
+              </p:cNvPr>
+              <p:cNvCxnSpPr>
+                <a:stCxn id="15" idx="5"/>
+                <a:endCxn id="16" idx="1"/>
+              </p:cNvCxnSpPr>
+              <p:nvPr/>
+            </p:nvCxnSpPr>
+            <p:spPr>
+              <a:xfrm flipV="1">
+                <a:off x="9445745" y="4090864"/>
+                <a:ext cx="780050" cy="237768"/>
+              </a:xfrm>
+              <a:prstGeom prst="line">
+                <a:avLst/>
+              </a:prstGeom>
+              <a:ln w="38100">
+                <a:solidFill>
+                  <a:srgbClr val="FF0000"/>
+                </a:solidFill>
+              </a:ln>
+            </p:spPr>
+            <p:style>
+              <a:lnRef idx="3">
+                <a:schemeClr val="accent2"/>
+              </a:lnRef>
+              <a:fillRef idx="0">
+                <a:schemeClr val="accent2"/>
+              </a:fillRef>
+              <a:effectRef idx="2">
+                <a:schemeClr val="accent2"/>
+              </a:effectRef>
+              <a:fontRef idx="minor">
+                <a:schemeClr val="tx1"/>
+              </a:fontRef>
+            </p:style>
+          </p:cxnSp>
+          <p:cxnSp>
+            <p:nvCxnSpPr>
+              <p:cNvPr id="20" name="Straight Connector 19">
+                <a:extLst>
+                  <a:ext uri="{FF2B5EF4-FFF2-40B4-BE49-F238E27FC236}">
+                    <a16:creationId xmlns:a16="http://schemas.microsoft.com/office/drawing/2014/main" id="{24CBD97A-F972-8A92-2A0D-E52B4E6101E6}"/>
+                  </a:ext>
+                </a:extLst>
+              </p:cNvPr>
+              <p:cNvCxnSpPr>
+                <a:cxnSpLocks/>
+                <a:stCxn id="16" idx="6"/>
+                <a:endCxn id="17" idx="1"/>
+              </p:cNvCxnSpPr>
+              <p:nvPr/>
+            </p:nvCxnSpPr>
+            <p:spPr>
+              <a:xfrm flipV="1">
+                <a:off x="10373670" y="3712801"/>
+                <a:ext cx="743608" cy="311706"/>
+              </a:xfrm>
+              <a:prstGeom prst="line">
+                <a:avLst/>
+              </a:prstGeom>
+              <a:ln w="38100">
+                <a:solidFill>
+                  <a:srgbClr val="FF0000"/>
+                </a:solidFill>
+              </a:ln>
+            </p:spPr>
+            <p:style>
+              <a:lnRef idx="3">
+                <a:schemeClr val="accent2"/>
+              </a:lnRef>
+              <a:fillRef idx="0">
+                <a:schemeClr val="accent2"/>
+              </a:fillRef>
+              <a:effectRef idx="2">
+                <a:schemeClr val="accent2"/>
+              </a:effectRef>
+              <a:fontRef idx="minor">
+                <a:schemeClr val="tx1"/>
+              </a:fontRef>
+            </p:style>
+          </p:cxnSp>
+          <p:cxnSp>
+            <p:nvCxnSpPr>
+              <p:cNvPr id="21" name="Straight Connector 20">
+                <a:extLst>
+                  <a:ext uri="{FF2B5EF4-FFF2-40B4-BE49-F238E27FC236}">
+                    <a16:creationId xmlns:a16="http://schemas.microsoft.com/office/drawing/2014/main" id="{F5D419E0-E80F-8BCF-E7F3-ADC76A7E784A}"/>
+                  </a:ext>
+                </a:extLst>
+              </p:cNvPr>
+              <p:cNvCxnSpPr>
+                <a:cxnSpLocks/>
+                <a:stCxn id="17" idx="6"/>
+              </p:cNvCxnSpPr>
+              <p:nvPr/>
+            </p:nvCxnSpPr>
+            <p:spPr>
+              <a:xfrm>
+                <a:off x="11265153" y="3646444"/>
+                <a:ext cx="501960" cy="338104"/>
+              </a:xfrm>
+              <a:prstGeom prst="line">
+                <a:avLst/>
+              </a:prstGeom>
+              <a:ln w="38100">
+                <a:solidFill>
+                  <a:srgbClr val="FF0000"/>
+                </a:solidFill>
+              </a:ln>
+            </p:spPr>
+            <p:style>
+              <a:lnRef idx="3">
+                <a:schemeClr val="accent2"/>
+              </a:lnRef>
+              <a:fillRef idx="0">
+                <a:schemeClr val="accent2"/>
+              </a:fillRef>
+              <a:effectRef idx="2">
+                <a:schemeClr val="accent2"/>
+              </a:effectRef>
+              <a:fontRef idx="minor">
+                <a:schemeClr val="tx1"/>
+              </a:fontRef>
+            </p:style>
+          </p:cxnSp>
+          <p:sp>
+            <p:nvSpPr>
+              <p:cNvPr id="22" name="TextBox 21">
+                <a:extLst>
+                  <a:ext uri="{FF2B5EF4-FFF2-40B4-BE49-F238E27FC236}">
+                    <a16:creationId xmlns:a16="http://schemas.microsoft.com/office/drawing/2014/main" id="{250075A4-81BE-C910-3351-A453ED224566}"/>
+                  </a:ext>
+                </a:extLst>
+              </p:cNvPr>
+              <p:cNvSpPr txBox="1"/>
+              <p:nvPr/>
+            </p:nvSpPr>
+            <p:spPr>
+              <a:xfrm>
+                <a:off x="10019857" y="4829312"/>
+                <a:ext cx="1158673" cy="338554"/>
+              </a:xfrm>
+              <a:prstGeom prst="rect">
+                <a:avLst/>
+              </a:prstGeom>
+              <a:noFill/>
+            </p:spPr>
+            <p:txBody>
+              <a:bodyPr wrap="square" rtlCol="0">
+                <a:spAutoFit/>
+              </a:bodyPr>
+              <a:lstStyle/>
+              <a:p>
+                <a:r>
+                  <a:rPr lang="es-419" sz="1600" dirty="0">
+                    <a:solidFill>
+                      <a:schemeClr val="bg1"/>
+                    </a:solidFill>
+                  </a:rPr>
+                  <a:t>Semanas</a:t>
+                </a:r>
+              </a:p>
+            </p:txBody>
+          </p:sp>
+          <p:sp>
+            <p:nvSpPr>
+              <p:cNvPr id="23" name="TextBox 22">
+                <a:extLst>
+                  <a:ext uri="{FF2B5EF4-FFF2-40B4-BE49-F238E27FC236}">
+                    <a16:creationId xmlns:a16="http://schemas.microsoft.com/office/drawing/2014/main" id="{5CC4EF75-2540-8B41-DBB2-AA4DB4D673DE}"/>
+                  </a:ext>
+                </a:extLst>
+              </p:cNvPr>
+              <p:cNvSpPr txBox="1"/>
+              <p:nvPr/>
+            </p:nvSpPr>
+            <p:spPr>
+              <a:xfrm rot="5400000">
+                <a:off x="7876057" y="3884535"/>
+                <a:ext cx="1494865" cy="830997"/>
+              </a:xfrm>
+              <a:prstGeom prst="rect">
+                <a:avLst/>
+              </a:prstGeom>
+              <a:noFill/>
+            </p:spPr>
+            <p:txBody>
+              <a:bodyPr wrap="square" rtlCol="0">
+                <a:spAutoFit/>
+              </a:bodyPr>
+              <a:lstStyle/>
+              <a:p>
+                <a:r>
+                  <a:rPr lang="es-419" sz="1600" dirty="0">
+                    <a:solidFill>
+                      <a:schemeClr val="bg1"/>
+                    </a:solidFill>
+                  </a:rPr>
+                  <a:t>Índice de reducción de backlog</a:t>
+                </a:r>
+              </a:p>
+            </p:txBody>
+          </p:sp>
+          <p:cxnSp>
+            <p:nvCxnSpPr>
+              <p:cNvPr id="13" name="Straight Arrow Connector 12">
+                <a:extLst>
+                  <a:ext uri="{FF2B5EF4-FFF2-40B4-BE49-F238E27FC236}">
+                    <a16:creationId xmlns:a16="http://schemas.microsoft.com/office/drawing/2014/main" id="{FB097965-7D0B-9052-AC22-5FF05963616D}"/>
+                  </a:ext>
+                </a:extLst>
+              </p:cNvPr>
+              <p:cNvCxnSpPr>
+                <a:cxnSpLocks/>
+              </p:cNvCxnSpPr>
+              <p:nvPr/>
+            </p:nvCxnSpPr>
+            <p:spPr>
+              <a:xfrm flipV="1">
+                <a:off x="9072772" y="3443903"/>
+                <a:ext cx="0" cy="1543574"/>
+              </a:xfrm>
+              <a:prstGeom prst="straightConnector1">
+                <a:avLst/>
+              </a:prstGeom>
+              <a:ln w="38100">
+                <a:solidFill>
+                  <a:schemeClr val="bg1"/>
+                </a:solidFill>
+                <a:tailEnd type="triangle"/>
+              </a:ln>
+            </p:spPr>
+            <p:style>
+              <a:lnRef idx="3">
+                <a:schemeClr val="dk1"/>
+              </a:lnRef>
+              <a:fillRef idx="0">
+                <a:schemeClr val="dk1"/>
+              </a:fillRef>
+              <a:effectRef idx="2">
+                <a:schemeClr val="dk1"/>
+              </a:effectRef>
+              <a:fontRef idx="minor">
+                <a:schemeClr val="tx1"/>
+              </a:fontRef>
+            </p:style>
+          </p:cxnSp>
+        </p:grpSp>
+      </p:grpSp>
+    </p:spTree>
+    <p:extLst>
+      <p:ext uri="{BB962C8B-B14F-4D97-AF65-F5344CB8AC3E}">
+        <p14:creationId xmlns:p14="http://schemas.microsoft.com/office/powerpoint/2010/main" val="3452181288"/>
+      </p:ext>
+    </p:extLst>
+  </p:cSld>
+  <p:clrMapOvr>
+    <a:masterClrMapping/>
+  </p:clrMapOvr>
+</p:sld>
+</file>
+
 <file path=ppt/theme/theme1.xml><?xml version="1.0" encoding="utf-8"?>
 <a:theme xmlns:a="http://schemas.openxmlformats.org/drawingml/2006/main" name="Office Theme">
   <a:themeElements>

</xml_diff>

<commit_message>
update: missing sessions from classes 1,2,3
Signed-off-by: the-other-mariana <mariana.avalos.arce@gmail.com>
</commit_message>
<xml_diff>
--- a/PM1/project-planning/week6/ideas.pptx
+++ b/PM1/project-planning/week6/ideas.pptx
@@ -271,7 +271,7 @@
           <a:p>
             <a:fld id="{64AF7922-E34A-4A1F-BA1D-585994EB53A8}" type="datetimeFigureOut">
               <a:rPr lang="es-419" smtClean="0"/>
-              <a:t>18/10/2022</a:t>
+              <a:t>19/10/2022</a:t>
             </a:fld>
             <a:endParaRPr lang="es-419"/>
           </a:p>
@@ -471,7 +471,7 @@
           <a:p>
             <a:fld id="{64AF7922-E34A-4A1F-BA1D-585994EB53A8}" type="datetimeFigureOut">
               <a:rPr lang="es-419" smtClean="0"/>
-              <a:t>18/10/2022</a:t>
+              <a:t>19/10/2022</a:t>
             </a:fld>
             <a:endParaRPr lang="es-419"/>
           </a:p>
@@ -681,7 +681,7 @@
           <a:p>
             <a:fld id="{64AF7922-E34A-4A1F-BA1D-585994EB53A8}" type="datetimeFigureOut">
               <a:rPr lang="es-419" smtClean="0"/>
-              <a:t>18/10/2022</a:t>
+              <a:t>19/10/2022</a:t>
             </a:fld>
             <a:endParaRPr lang="es-419"/>
           </a:p>
@@ -881,7 +881,7 @@
           <a:p>
             <a:fld id="{64AF7922-E34A-4A1F-BA1D-585994EB53A8}" type="datetimeFigureOut">
               <a:rPr lang="es-419" smtClean="0"/>
-              <a:t>18/10/2022</a:t>
+              <a:t>19/10/2022</a:t>
             </a:fld>
             <a:endParaRPr lang="es-419"/>
           </a:p>
@@ -1157,7 +1157,7 @@
           <a:p>
             <a:fld id="{64AF7922-E34A-4A1F-BA1D-585994EB53A8}" type="datetimeFigureOut">
               <a:rPr lang="es-419" smtClean="0"/>
-              <a:t>18/10/2022</a:t>
+              <a:t>19/10/2022</a:t>
             </a:fld>
             <a:endParaRPr lang="es-419"/>
           </a:p>
@@ -1425,7 +1425,7 @@
           <a:p>
             <a:fld id="{64AF7922-E34A-4A1F-BA1D-585994EB53A8}" type="datetimeFigureOut">
               <a:rPr lang="es-419" smtClean="0"/>
-              <a:t>18/10/2022</a:t>
+              <a:t>19/10/2022</a:t>
             </a:fld>
             <a:endParaRPr lang="es-419"/>
           </a:p>
@@ -1840,7 +1840,7 @@
           <a:p>
             <a:fld id="{64AF7922-E34A-4A1F-BA1D-585994EB53A8}" type="datetimeFigureOut">
               <a:rPr lang="es-419" smtClean="0"/>
-              <a:t>18/10/2022</a:t>
+              <a:t>19/10/2022</a:t>
             </a:fld>
             <a:endParaRPr lang="es-419"/>
           </a:p>
@@ -1982,7 +1982,7 @@
           <a:p>
             <a:fld id="{64AF7922-E34A-4A1F-BA1D-585994EB53A8}" type="datetimeFigureOut">
               <a:rPr lang="es-419" smtClean="0"/>
-              <a:t>18/10/2022</a:t>
+              <a:t>19/10/2022</a:t>
             </a:fld>
             <a:endParaRPr lang="es-419"/>
           </a:p>
@@ -2095,7 +2095,7 @@
           <a:p>
             <a:fld id="{64AF7922-E34A-4A1F-BA1D-585994EB53A8}" type="datetimeFigureOut">
               <a:rPr lang="es-419" smtClean="0"/>
-              <a:t>18/10/2022</a:t>
+              <a:t>19/10/2022</a:t>
             </a:fld>
             <a:endParaRPr lang="es-419"/>
           </a:p>
@@ -2408,7 +2408,7 @@
           <a:p>
             <a:fld id="{64AF7922-E34A-4A1F-BA1D-585994EB53A8}" type="datetimeFigureOut">
               <a:rPr lang="es-419" smtClean="0"/>
-              <a:t>18/10/2022</a:t>
+              <a:t>19/10/2022</a:t>
             </a:fld>
             <a:endParaRPr lang="es-419"/>
           </a:p>
@@ -2697,7 +2697,7 @@
           <a:p>
             <a:fld id="{64AF7922-E34A-4A1F-BA1D-585994EB53A8}" type="datetimeFigureOut">
               <a:rPr lang="es-419" smtClean="0"/>
-              <a:t>18/10/2022</a:t>
+              <a:t>19/10/2022</a:t>
             </a:fld>
             <a:endParaRPr lang="es-419"/>
           </a:p>
@@ -2940,7 +2940,7 @@
           <a:p>
             <a:fld id="{64AF7922-E34A-4A1F-BA1D-585994EB53A8}" type="datetimeFigureOut">
               <a:rPr lang="es-419" smtClean="0"/>
-              <a:t>18/10/2022</a:t>
+              <a:t>19/10/2022</a:t>
             </a:fld>
             <a:endParaRPr lang="es-419"/>
           </a:p>
@@ -14103,7 +14103,7 @@
                       <a:schemeClr val="bg1"/>
                     </a:solidFill>
                   </a:rPr>
-                  <a:t>Índice de reducción de backlog</a:t>
+                  <a:t>Índice de manejo de backlog</a:t>
                 </a:r>
               </a:p>
             </p:txBody>

</xml_diff>